<commit_message>
Week 13 - Final report and Presentation
</commit_message>
<xml_diff>
--- a/Week 13 - Final week/Bank Marketing Campaign Presentation.pptx
+++ b/Week 13 - Final week/Bank Marketing Campaign Presentation.pptx
@@ -5,7 +5,7 @@
     <p:sldMasterId id="2147483648" r:id="rId1"/>
   </p:sldMasterIdLst>
   <p:notesMasterIdLst>
-    <p:notesMasterId r:id="rId16"/>
+    <p:notesMasterId r:id="rId20"/>
   </p:notesMasterIdLst>
   <p:sldIdLst>
     <p:sldId id="256" r:id="rId2"/>
@@ -16,12 +16,16 @@
     <p:sldId id="261" r:id="rId7"/>
     <p:sldId id="262" r:id="rId8"/>
     <p:sldId id="263" r:id="rId9"/>
-    <p:sldId id="264" r:id="rId10"/>
-    <p:sldId id="270" r:id="rId11"/>
-    <p:sldId id="283" r:id="rId12"/>
-    <p:sldId id="276" r:id="rId13"/>
-    <p:sldId id="278" r:id="rId14"/>
-    <p:sldId id="281" r:id="rId15"/>
+    <p:sldId id="284" r:id="rId10"/>
+    <p:sldId id="285" r:id="rId11"/>
+    <p:sldId id="286" r:id="rId12"/>
+    <p:sldId id="287" r:id="rId13"/>
+    <p:sldId id="288" r:id="rId14"/>
+    <p:sldId id="289" r:id="rId15"/>
+    <p:sldId id="290" r:id="rId16"/>
+    <p:sldId id="276" r:id="rId17"/>
+    <p:sldId id="291" r:id="rId18"/>
+    <p:sldId id="281" r:id="rId19"/>
   </p:sldIdLst>
   <p:sldSz cx="12192000" cy="6858000"/>
   <p:notesSz cx="6858000" cy="9144000"/>
@@ -270,7 +274,7 @@
       </p15:sldGuideLst>
     </p:ext>
     <p:ext uri="http://customooxmlschemas.google.com/">
-      <go:slidesCustomData xmlns:go="http://customooxmlschemas.google.com/" xmlns:ahyp="http://schemas.microsoft.com/office/drawing/2018/hyperlinkcolor" xmlns:p15="http://schemas.microsoft.com/office/powerpoint/2012/main" xmlns:p14="http://schemas.microsoft.com/office/powerpoint/2010/main" xmlns:com="http://schemas.openxmlformats.org/drawingml/2006/compatibility" xmlns:pvml="urn:schemas-microsoft-com:office:powerpoint" xmlns:v="urn:schemas-microsoft-com:vml" xmlns:o="urn:schemas-microsoft-com:office:office" xmlns:dgm="http://schemas.openxmlformats.org/drawingml/2006/diagram" xmlns:c="http://schemas.openxmlformats.org/drawingml/2006/chart" xmlns:mv="urn:schemas-microsoft-com:mac:vml" xmlns:mc="http://schemas.openxmlformats.org/markup-compatibility/2006" xmlns="" r:id="rId38" roundtripDataSignature="AMtx7mj2XkNqIOC65aK6hbps7pkfdLHCYg=="/>
+      <go:slidesCustomData xmlns="" xmlns:mc="http://schemas.openxmlformats.org/markup-compatibility/2006" xmlns:mv="urn:schemas-microsoft-com:mac:vml" xmlns:c="http://schemas.openxmlformats.org/drawingml/2006/chart" xmlns:dgm="http://schemas.openxmlformats.org/drawingml/2006/diagram" xmlns:o="urn:schemas-microsoft-com:office:office" xmlns:v="urn:schemas-microsoft-com:vml" xmlns:pvml="urn:schemas-microsoft-com:office:powerpoint" xmlns:com="http://schemas.openxmlformats.org/drawingml/2006/compatibility" xmlns:p14="http://schemas.microsoft.com/office/powerpoint/2010/main" xmlns:p15="http://schemas.microsoft.com/office/powerpoint/2012/main" xmlns:ahyp="http://schemas.microsoft.com/office/drawing/2018/hyperlinkcolor" xmlns:go="http://customooxmlschemas.google.com/" r:id="rId38" roundtripDataSignature="AMtx7mj2XkNqIOC65aK6hbps7pkfdLHCYg=="/>
     </p:ext>
   </p:extLst>
 </p:presentation>
@@ -1672,7 +1676,7 @@
   <p:cSld>
     <p:spTree>
       <p:nvGrpSpPr>
-        <p:cNvPr id="1" name="Shape 237"/>
+        <p:cNvPr id="1" name="Shape 184"/>
         <p:cNvGrpSpPr/>
         <p:nvPr/>
       </p:nvGrpSpPr>
@@ -1686,7 +1690,7 @@
       </p:grpSpPr>
       <p:sp>
         <p:nvSpPr>
-          <p:cNvPr id="238" name="Google Shape;238;p15:notes"/>
+          <p:cNvPr id="185" name="Google Shape;185;p8:notes"/>
           <p:cNvSpPr>
             <a:spLocks noGrp="1" noRot="1" noChangeAspect="1"/>
           </p:cNvSpPr>
@@ -1737,7 +1741,7 @@
       </p:sp>
       <p:sp>
         <p:nvSpPr>
-          <p:cNvPr id="239" name="Google Shape;239;p15:notes"/>
+          <p:cNvPr id="186" name="Google Shape;186;p8:notes"/>
           <p:cNvSpPr txBox="1">
             <a:spLocks noGrp="1"/>
           </p:cNvSpPr>
@@ -1773,13 +1777,13 @@
               </a:spcAft>
               <a:buNone/>
             </a:pPr>
-            <a:endParaRPr/>
+            <a:endParaRPr dirty="0"/>
           </a:p>
         </p:txBody>
       </p:sp>
       <p:sp>
         <p:nvSpPr>
-          <p:cNvPr id="240" name="Google Shape;240;p15:notes"/>
+          <p:cNvPr id="187" name="Google Shape;187;p8:notes"/>
           <p:cNvSpPr txBox="1">
             <a:spLocks noGrp="1"/>
           </p:cNvSpPr>
@@ -1826,7 +1830,7 @@
     </p:spTree>
     <p:extLst>
       <p:ext uri="{BB962C8B-B14F-4D97-AF65-F5344CB8AC3E}">
-        <p14:creationId xmlns:p14="http://schemas.microsoft.com/office/powerpoint/2010/main" val="2732255487"/>
+        <p14:creationId xmlns:p14="http://schemas.microsoft.com/office/powerpoint/2010/main" val="1295646449"/>
       </p:ext>
     </p:extLst>
   </p:cSld>
@@ -1841,7 +1845,7 @@
   <p:cSld>
     <p:spTree>
       <p:nvGrpSpPr>
-        <p:cNvPr id="1" name="Shape 237"/>
+        <p:cNvPr id="1" name="Shape 184"/>
         <p:cNvGrpSpPr/>
         <p:nvPr/>
       </p:nvGrpSpPr>
@@ -1855,7 +1859,7 @@
       </p:grpSpPr>
       <p:sp>
         <p:nvSpPr>
-          <p:cNvPr id="238" name="Google Shape;238;p15:notes"/>
+          <p:cNvPr id="185" name="Google Shape;185;p8:notes"/>
           <p:cNvSpPr>
             <a:spLocks noGrp="1" noRot="1" noChangeAspect="1"/>
           </p:cNvSpPr>
@@ -1906,7 +1910,7 @@
       </p:sp>
       <p:sp>
         <p:nvSpPr>
-          <p:cNvPr id="239" name="Google Shape;239;p15:notes"/>
+          <p:cNvPr id="186" name="Google Shape;186;p8:notes"/>
           <p:cNvSpPr txBox="1">
             <a:spLocks noGrp="1"/>
           </p:cNvSpPr>
@@ -1942,13 +1946,13 @@
               </a:spcAft>
               <a:buNone/>
             </a:pPr>
-            <a:endParaRPr/>
+            <a:endParaRPr dirty="0"/>
           </a:p>
         </p:txBody>
       </p:sp>
       <p:sp>
         <p:nvSpPr>
-          <p:cNvPr id="240" name="Google Shape;240;p15:notes"/>
+          <p:cNvPr id="187" name="Google Shape;187;p8:notes"/>
           <p:cNvSpPr txBox="1">
             <a:spLocks noGrp="1"/>
           </p:cNvSpPr>
@@ -1995,7 +1999,7 @@
     </p:spTree>
     <p:extLst>
       <p:ext uri="{BB962C8B-B14F-4D97-AF65-F5344CB8AC3E}">
-        <p14:creationId xmlns:p14="http://schemas.microsoft.com/office/powerpoint/2010/main" val="389222408"/>
+        <p14:creationId xmlns:p14="http://schemas.microsoft.com/office/powerpoint/2010/main" val="3992177169"/>
       </p:ext>
     </p:extLst>
   </p:cSld>
@@ -2006,6 +2010,682 @@
 </file>
 
 <file path=ppt/notesSlides/notesSlide12.xml><?xml version="1.0" encoding="utf-8"?>
+<p:notes xmlns:a="http://schemas.openxmlformats.org/drawingml/2006/main" xmlns:r="http://schemas.openxmlformats.org/officeDocument/2006/relationships" xmlns:p="http://schemas.openxmlformats.org/presentationml/2006/main" showMasterSp="0" showMasterPhAnim="0">
+  <p:cSld>
+    <p:spTree>
+      <p:nvGrpSpPr>
+        <p:cNvPr id="1" name="Shape 184"/>
+        <p:cNvGrpSpPr/>
+        <p:nvPr/>
+      </p:nvGrpSpPr>
+      <p:grpSpPr>
+        <a:xfrm>
+          <a:off x="0" y="0"/>
+          <a:ext cx="0" cy="0"/>
+          <a:chOff x="0" y="0"/>
+          <a:chExt cx="0" cy="0"/>
+        </a:xfrm>
+      </p:grpSpPr>
+      <p:sp>
+        <p:nvSpPr>
+          <p:cNvPr id="185" name="Google Shape;185;p8:notes"/>
+          <p:cNvSpPr>
+            <a:spLocks noGrp="1" noRot="1" noChangeAspect="1"/>
+          </p:cNvSpPr>
+          <p:nvPr>
+            <p:ph type="sldImg" idx="2"/>
+          </p:nvPr>
+        </p:nvSpPr>
+        <p:spPr>
+          <a:xfrm>
+            <a:off x="685800" y="1143000"/>
+            <a:ext cx="5486400" cy="3086100"/>
+          </a:xfrm>
+          <a:custGeom>
+            <a:avLst/>
+            <a:gdLst/>
+            <a:ahLst/>
+            <a:cxnLst/>
+            <a:rect l="l" t="t" r="r" b="b"/>
+            <a:pathLst>
+              <a:path w="120000" h="120000" extrusionOk="0">
+                <a:moveTo>
+                  <a:pt x="0" y="0"/>
+                </a:moveTo>
+                <a:lnTo>
+                  <a:pt x="120000" y="0"/>
+                </a:lnTo>
+                <a:lnTo>
+                  <a:pt x="120000" y="120000"/>
+                </a:lnTo>
+                <a:lnTo>
+                  <a:pt x="0" y="120000"/>
+                </a:lnTo>
+                <a:close/>
+              </a:path>
+            </a:pathLst>
+          </a:custGeom>
+          <a:noFill/>
+          <a:ln w="12700" cap="flat" cmpd="sng">
+            <a:solidFill>
+              <a:srgbClr val="000000"/>
+            </a:solidFill>
+            <a:prstDash val="solid"/>
+            <a:round/>
+            <a:headEnd type="none" w="sm" len="sm"/>
+            <a:tailEnd type="none" w="sm" len="sm"/>
+          </a:ln>
+        </p:spPr>
+      </p:sp>
+      <p:sp>
+        <p:nvSpPr>
+          <p:cNvPr id="186" name="Google Shape;186;p8:notes"/>
+          <p:cNvSpPr txBox="1">
+            <a:spLocks noGrp="1"/>
+          </p:cNvSpPr>
+          <p:nvPr>
+            <p:ph type="body" idx="1"/>
+          </p:nvPr>
+        </p:nvSpPr>
+        <p:spPr>
+          <a:xfrm>
+            <a:off x="685800" y="4400550"/>
+            <a:ext cx="5486400" cy="3600450"/>
+          </a:xfrm>
+          <a:prstGeom prst="rect">
+            <a:avLst/>
+          </a:prstGeom>
+          <a:noFill/>
+          <a:ln>
+            <a:noFill/>
+          </a:ln>
+        </p:spPr>
+        <p:txBody>
+          <a:bodyPr spcFirstLastPara="1" wrap="square" lIns="91425" tIns="45700" rIns="91425" bIns="45700" anchor="t" anchorCtr="0">
+            <a:noAutofit/>
+          </a:bodyPr>
+          <a:lstStyle/>
+          <a:p>
+            <a:pPr marL="0" lvl="0" indent="0" algn="l" rtl="0">
+              <a:spcBef>
+                <a:spcPts val="0"/>
+              </a:spcBef>
+              <a:spcAft>
+                <a:spcPts val="0"/>
+              </a:spcAft>
+              <a:buNone/>
+            </a:pPr>
+            <a:endParaRPr dirty="0"/>
+          </a:p>
+        </p:txBody>
+      </p:sp>
+      <p:sp>
+        <p:nvSpPr>
+          <p:cNvPr id="187" name="Google Shape;187;p8:notes"/>
+          <p:cNvSpPr txBox="1">
+            <a:spLocks noGrp="1"/>
+          </p:cNvSpPr>
+          <p:nvPr>
+            <p:ph type="sldNum" idx="12"/>
+          </p:nvPr>
+        </p:nvSpPr>
+        <p:spPr>
+          <a:xfrm>
+            <a:off x="3884613" y="8685213"/>
+            <a:ext cx="2971800" cy="458787"/>
+          </a:xfrm>
+          <a:prstGeom prst="rect">
+            <a:avLst/>
+          </a:prstGeom>
+          <a:noFill/>
+          <a:ln>
+            <a:noFill/>
+          </a:ln>
+        </p:spPr>
+        <p:txBody>
+          <a:bodyPr spcFirstLastPara="1" wrap="square" lIns="91425" tIns="45700" rIns="91425" bIns="45700" anchor="b" anchorCtr="0">
+            <a:noAutofit/>
+          </a:bodyPr>
+          <a:lstStyle/>
+          <a:p>
+            <a:pPr marL="0" lvl="0" indent="0" algn="r" rtl="0">
+              <a:spcBef>
+                <a:spcPts val="0"/>
+              </a:spcBef>
+              <a:spcAft>
+                <a:spcPts val="0"/>
+              </a:spcAft>
+              <a:buNone/>
+            </a:pPr>
+            <a:fld id="{00000000-1234-1234-1234-123412341234}" type="slidenum">
+              <a:rPr lang="en-US"/>
+              <a:t>12</a:t>
+            </a:fld>
+            <a:endParaRPr/>
+          </a:p>
+        </p:txBody>
+      </p:sp>
+    </p:spTree>
+    <p:extLst>
+      <p:ext uri="{BB962C8B-B14F-4D97-AF65-F5344CB8AC3E}">
+        <p14:creationId xmlns:p14="http://schemas.microsoft.com/office/powerpoint/2010/main" val="2964480142"/>
+      </p:ext>
+    </p:extLst>
+  </p:cSld>
+  <p:clrMapOvr>
+    <a:masterClrMapping/>
+  </p:clrMapOvr>
+</p:notes>
+</file>
+
+<file path=ppt/notesSlides/notesSlide13.xml><?xml version="1.0" encoding="utf-8"?>
+<p:notes xmlns:a="http://schemas.openxmlformats.org/drawingml/2006/main" xmlns:r="http://schemas.openxmlformats.org/officeDocument/2006/relationships" xmlns:p="http://schemas.openxmlformats.org/presentationml/2006/main" showMasterSp="0" showMasterPhAnim="0">
+  <p:cSld>
+    <p:spTree>
+      <p:nvGrpSpPr>
+        <p:cNvPr id="1" name="Shape 184"/>
+        <p:cNvGrpSpPr/>
+        <p:nvPr/>
+      </p:nvGrpSpPr>
+      <p:grpSpPr>
+        <a:xfrm>
+          <a:off x="0" y="0"/>
+          <a:ext cx="0" cy="0"/>
+          <a:chOff x="0" y="0"/>
+          <a:chExt cx="0" cy="0"/>
+        </a:xfrm>
+      </p:grpSpPr>
+      <p:sp>
+        <p:nvSpPr>
+          <p:cNvPr id="185" name="Google Shape;185;p8:notes"/>
+          <p:cNvSpPr>
+            <a:spLocks noGrp="1" noRot="1" noChangeAspect="1"/>
+          </p:cNvSpPr>
+          <p:nvPr>
+            <p:ph type="sldImg" idx="2"/>
+          </p:nvPr>
+        </p:nvSpPr>
+        <p:spPr>
+          <a:xfrm>
+            <a:off x="685800" y="1143000"/>
+            <a:ext cx="5486400" cy="3086100"/>
+          </a:xfrm>
+          <a:custGeom>
+            <a:avLst/>
+            <a:gdLst/>
+            <a:ahLst/>
+            <a:cxnLst/>
+            <a:rect l="l" t="t" r="r" b="b"/>
+            <a:pathLst>
+              <a:path w="120000" h="120000" extrusionOk="0">
+                <a:moveTo>
+                  <a:pt x="0" y="0"/>
+                </a:moveTo>
+                <a:lnTo>
+                  <a:pt x="120000" y="0"/>
+                </a:lnTo>
+                <a:lnTo>
+                  <a:pt x="120000" y="120000"/>
+                </a:lnTo>
+                <a:lnTo>
+                  <a:pt x="0" y="120000"/>
+                </a:lnTo>
+                <a:close/>
+              </a:path>
+            </a:pathLst>
+          </a:custGeom>
+          <a:noFill/>
+          <a:ln w="12700" cap="flat" cmpd="sng">
+            <a:solidFill>
+              <a:srgbClr val="000000"/>
+            </a:solidFill>
+            <a:prstDash val="solid"/>
+            <a:round/>
+            <a:headEnd type="none" w="sm" len="sm"/>
+            <a:tailEnd type="none" w="sm" len="sm"/>
+          </a:ln>
+        </p:spPr>
+      </p:sp>
+      <p:sp>
+        <p:nvSpPr>
+          <p:cNvPr id="186" name="Google Shape;186;p8:notes"/>
+          <p:cNvSpPr txBox="1">
+            <a:spLocks noGrp="1"/>
+          </p:cNvSpPr>
+          <p:nvPr>
+            <p:ph type="body" idx="1"/>
+          </p:nvPr>
+        </p:nvSpPr>
+        <p:spPr>
+          <a:xfrm>
+            <a:off x="685800" y="4400550"/>
+            <a:ext cx="5486400" cy="3600450"/>
+          </a:xfrm>
+          <a:prstGeom prst="rect">
+            <a:avLst/>
+          </a:prstGeom>
+          <a:noFill/>
+          <a:ln>
+            <a:noFill/>
+          </a:ln>
+        </p:spPr>
+        <p:txBody>
+          <a:bodyPr spcFirstLastPara="1" wrap="square" lIns="91425" tIns="45700" rIns="91425" bIns="45700" anchor="t" anchorCtr="0">
+            <a:noAutofit/>
+          </a:bodyPr>
+          <a:lstStyle/>
+          <a:p>
+            <a:pPr marL="0" lvl="0" indent="0" algn="l" rtl="0">
+              <a:spcBef>
+                <a:spcPts val="0"/>
+              </a:spcBef>
+              <a:spcAft>
+                <a:spcPts val="0"/>
+              </a:spcAft>
+              <a:buNone/>
+            </a:pPr>
+            <a:endParaRPr dirty="0"/>
+          </a:p>
+        </p:txBody>
+      </p:sp>
+      <p:sp>
+        <p:nvSpPr>
+          <p:cNvPr id="187" name="Google Shape;187;p8:notes"/>
+          <p:cNvSpPr txBox="1">
+            <a:spLocks noGrp="1"/>
+          </p:cNvSpPr>
+          <p:nvPr>
+            <p:ph type="sldNum" idx="12"/>
+          </p:nvPr>
+        </p:nvSpPr>
+        <p:spPr>
+          <a:xfrm>
+            <a:off x="3884613" y="8685213"/>
+            <a:ext cx="2971800" cy="458787"/>
+          </a:xfrm>
+          <a:prstGeom prst="rect">
+            <a:avLst/>
+          </a:prstGeom>
+          <a:noFill/>
+          <a:ln>
+            <a:noFill/>
+          </a:ln>
+        </p:spPr>
+        <p:txBody>
+          <a:bodyPr spcFirstLastPara="1" wrap="square" lIns="91425" tIns="45700" rIns="91425" bIns="45700" anchor="b" anchorCtr="0">
+            <a:noAutofit/>
+          </a:bodyPr>
+          <a:lstStyle/>
+          <a:p>
+            <a:pPr marL="0" lvl="0" indent="0" algn="r" rtl="0">
+              <a:spcBef>
+                <a:spcPts val="0"/>
+              </a:spcBef>
+              <a:spcAft>
+                <a:spcPts val="0"/>
+              </a:spcAft>
+              <a:buNone/>
+            </a:pPr>
+            <a:fld id="{00000000-1234-1234-1234-123412341234}" type="slidenum">
+              <a:rPr lang="en-US"/>
+              <a:t>13</a:t>
+            </a:fld>
+            <a:endParaRPr/>
+          </a:p>
+        </p:txBody>
+      </p:sp>
+    </p:spTree>
+    <p:extLst>
+      <p:ext uri="{BB962C8B-B14F-4D97-AF65-F5344CB8AC3E}">
+        <p14:creationId xmlns:p14="http://schemas.microsoft.com/office/powerpoint/2010/main" val="387826607"/>
+      </p:ext>
+    </p:extLst>
+  </p:cSld>
+  <p:clrMapOvr>
+    <a:masterClrMapping/>
+  </p:clrMapOvr>
+</p:notes>
+</file>
+
+<file path=ppt/notesSlides/notesSlide14.xml><?xml version="1.0" encoding="utf-8"?>
+<p:notes xmlns:a="http://schemas.openxmlformats.org/drawingml/2006/main" xmlns:r="http://schemas.openxmlformats.org/officeDocument/2006/relationships" xmlns:p="http://schemas.openxmlformats.org/presentationml/2006/main" showMasterSp="0" showMasterPhAnim="0">
+  <p:cSld>
+    <p:spTree>
+      <p:nvGrpSpPr>
+        <p:cNvPr id="1" name="Shape 184"/>
+        <p:cNvGrpSpPr/>
+        <p:nvPr/>
+      </p:nvGrpSpPr>
+      <p:grpSpPr>
+        <a:xfrm>
+          <a:off x="0" y="0"/>
+          <a:ext cx="0" cy="0"/>
+          <a:chOff x="0" y="0"/>
+          <a:chExt cx="0" cy="0"/>
+        </a:xfrm>
+      </p:grpSpPr>
+      <p:sp>
+        <p:nvSpPr>
+          <p:cNvPr id="185" name="Google Shape;185;p8:notes"/>
+          <p:cNvSpPr>
+            <a:spLocks noGrp="1" noRot="1" noChangeAspect="1"/>
+          </p:cNvSpPr>
+          <p:nvPr>
+            <p:ph type="sldImg" idx="2"/>
+          </p:nvPr>
+        </p:nvSpPr>
+        <p:spPr>
+          <a:xfrm>
+            <a:off x="685800" y="1143000"/>
+            <a:ext cx="5486400" cy="3086100"/>
+          </a:xfrm>
+          <a:custGeom>
+            <a:avLst/>
+            <a:gdLst/>
+            <a:ahLst/>
+            <a:cxnLst/>
+            <a:rect l="l" t="t" r="r" b="b"/>
+            <a:pathLst>
+              <a:path w="120000" h="120000" extrusionOk="0">
+                <a:moveTo>
+                  <a:pt x="0" y="0"/>
+                </a:moveTo>
+                <a:lnTo>
+                  <a:pt x="120000" y="0"/>
+                </a:lnTo>
+                <a:lnTo>
+                  <a:pt x="120000" y="120000"/>
+                </a:lnTo>
+                <a:lnTo>
+                  <a:pt x="0" y="120000"/>
+                </a:lnTo>
+                <a:close/>
+              </a:path>
+            </a:pathLst>
+          </a:custGeom>
+          <a:noFill/>
+          <a:ln w="12700" cap="flat" cmpd="sng">
+            <a:solidFill>
+              <a:srgbClr val="000000"/>
+            </a:solidFill>
+            <a:prstDash val="solid"/>
+            <a:round/>
+            <a:headEnd type="none" w="sm" len="sm"/>
+            <a:tailEnd type="none" w="sm" len="sm"/>
+          </a:ln>
+        </p:spPr>
+      </p:sp>
+      <p:sp>
+        <p:nvSpPr>
+          <p:cNvPr id="186" name="Google Shape;186;p8:notes"/>
+          <p:cNvSpPr txBox="1">
+            <a:spLocks noGrp="1"/>
+          </p:cNvSpPr>
+          <p:nvPr>
+            <p:ph type="body" idx="1"/>
+          </p:nvPr>
+        </p:nvSpPr>
+        <p:spPr>
+          <a:xfrm>
+            <a:off x="685800" y="4400550"/>
+            <a:ext cx="5486400" cy="3600450"/>
+          </a:xfrm>
+          <a:prstGeom prst="rect">
+            <a:avLst/>
+          </a:prstGeom>
+          <a:noFill/>
+          <a:ln>
+            <a:noFill/>
+          </a:ln>
+        </p:spPr>
+        <p:txBody>
+          <a:bodyPr spcFirstLastPara="1" wrap="square" lIns="91425" tIns="45700" rIns="91425" bIns="45700" anchor="t" anchorCtr="0">
+            <a:noAutofit/>
+          </a:bodyPr>
+          <a:lstStyle/>
+          <a:p>
+            <a:pPr marL="0" lvl="0" indent="0" algn="l" rtl="0">
+              <a:spcBef>
+                <a:spcPts val="0"/>
+              </a:spcBef>
+              <a:spcAft>
+                <a:spcPts val="0"/>
+              </a:spcAft>
+              <a:buNone/>
+            </a:pPr>
+            <a:endParaRPr dirty="0"/>
+          </a:p>
+        </p:txBody>
+      </p:sp>
+      <p:sp>
+        <p:nvSpPr>
+          <p:cNvPr id="187" name="Google Shape;187;p8:notes"/>
+          <p:cNvSpPr txBox="1">
+            <a:spLocks noGrp="1"/>
+          </p:cNvSpPr>
+          <p:nvPr>
+            <p:ph type="sldNum" idx="12"/>
+          </p:nvPr>
+        </p:nvSpPr>
+        <p:spPr>
+          <a:xfrm>
+            <a:off x="3884613" y="8685213"/>
+            <a:ext cx="2971800" cy="458787"/>
+          </a:xfrm>
+          <a:prstGeom prst="rect">
+            <a:avLst/>
+          </a:prstGeom>
+          <a:noFill/>
+          <a:ln>
+            <a:noFill/>
+          </a:ln>
+        </p:spPr>
+        <p:txBody>
+          <a:bodyPr spcFirstLastPara="1" wrap="square" lIns="91425" tIns="45700" rIns="91425" bIns="45700" anchor="b" anchorCtr="0">
+            <a:noAutofit/>
+          </a:bodyPr>
+          <a:lstStyle/>
+          <a:p>
+            <a:pPr marL="0" lvl="0" indent="0" algn="r" rtl="0">
+              <a:spcBef>
+                <a:spcPts val="0"/>
+              </a:spcBef>
+              <a:spcAft>
+                <a:spcPts val="0"/>
+              </a:spcAft>
+              <a:buNone/>
+            </a:pPr>
+            <a:fld id="{00000000-1234-1234-1234-123412341234}" type="slidenum">
+              <a:rPr lang="en-US"/>
+              <a:t>14</a:t>
+            </a:fld>
+            <a:endParaRPr/>
+          </a:p>
+        </p:txBody>
+      </p:sp>
+    </p:spTree>
+    <p:extLst>
+      <p:ext uri="{BB962C8B-B14F-4D97-AF65-F5344CB8AC3E}">
+        <p14:creationId xmlns:p14="http://schemas.microsoft.com/office/powerpoint/2010/main" val="164728817"/>
+      </p:ext>
+    </p:extLst>
+  </p:cSld>
+  <p:clrMapOvr>
+    <a:masterClrMapping/>
+  </p:clrMapOvr>
+</p:notes>
+</file>
+
+<file path=ppt/notesSlides/notesSlide15.xml><?xml version="1.0" encoding="utf-8"?>
+<p:notes xmlns:a="http://schemas.openxmlformats.org/drawingml/2006/main" xmlns:r="http://schemas.openxmlformats.org/officeDocument/2006/relationships" xmlns:p="http://schemas.openxmlformats.org/presentationml/2006/main" showMasterSp="0" showMasterPhAnim="0">
+  <p:cSld>
+    <p:spTree>
+      <p:nvGrpSpPr>
+        <p:cNvPr id="1" name="Shape 184"/>
+        <p:cNvGrpSpPr/>
+        <p:nvPr/>
+      </p:nvGrpSpPr>
+      <p:grpSpPr>
+        <a:xfrm>
+          <a:off x="0" y="0"/>
+          <a:ext cx="0" cy="0"/>
+          <a:chOff x="0" y="0"/>
+          <a:chExt cx="0" cy="0"/>
+        </a:xfrm>
+      </p:grpSpPr>
+      <p:sp>
+        <p:nvSpPr>
+          <p:cNvPr id="185" name="Google Shape;185;p8:notes"/>
+          <p:cNvSpPr>
+            <a:spLocks noGrp="1" noRot="1" noChangeAspect="1"/>
+          </p:cNvSpPr>
+          <p:nvPr>
+            <p:ph type="sldImg" idx="2"/>
+          </p:nvPr>
+        </p:nvSpPr>
+        <p:spPr>
+          <a:xfrm>
+            <a:off x="685800" y="1143000"/>
+            <a:ext cx="5486400" cy="3086100"/>
+          </a:xfrm>
+          <a:custGeom>
+            <a:avLst/>
+            <a:gdLst/>
+            <a:ahLst/>
+            <a:cxnLst/>
+            <a:rect l="l" t="t" r="r" b="b"/>
+            <a:pathLst>
+              <a:path w="120000" h="120000" extrusionOk="0">
+                <a:moveTo>
+                  <a:pt x="0" y="0"/>
+                </a:moveTo>
+                <a:lnTo>
+                  <a:pt x="120000" y="0"/>
+                </a:lnTo>
+                <a:lnTo>
+                  <a:pt x="120000" y="120000"/>
+                </a:lnTo>
+                <a:lnTo>
+                  <a:pt x="0" y="120000"/>
+                </a:lnTo>
+                <a:close/>
+              </a:path>
+            </a:pathLst>
+          </a:custGeom>
+          <a:noFill/>
+          <a:ln w="12700" cap="flat" cmpd="sng">
+            <a:solidFill>
+              <a:srgbClr val="000000"/>
+            </a:solidFill>
+            <a:prstDash val="solid"/>
+            <a:round/>
+            <a:headEnd type="none" w="sm" len="sm"/>
+            <a:tailEnd type="none" w="sm" len="sm"/>
+          </a:ln>
+        </p:spPr>
+      </p:sp>
+      <p:sp>
+        <p:nvSpPr>
+          <p:cNvPr id="186" name="Google Shape;186;p8:notes"/>
+          <p:cNvSpPr txBox="1">
+            <a:spLocks noGrp="1"/>
+          </p:cNvSpPr>
+          <p:nvPr>
+            <p:ph type="body" idx="1"/>
+          </p:nvPr>
+        </p:nvSpPr>
+        <p:spPr>
+          <a:xfrm>
+            <a:off x="685800" y="4400550"/>
+            <a:ext cx="5486400" cy="3600450"/>
+          </a:xfrm>
+          <a:prstGeom prst="rect">
+            <a:avLst/>
+          </a:prstGeom>
+          <a:noFill/>
+          <a:ln>
+            <a:noFill/>
+          </a:ln>
+        </p:spPr>
+        <p:txBody>
+          <a:bodyPr spcFirstLastPara="1" wrap="square" lIns="91425" tIns="45700" rIns="91425" bIns="45700" anchor="t" anchorCtr="0">
+            <a:noAutofit/>
+          </a:bodyPr>
+          <a:lstStyle/>
+          <a:p>
+            <a:pPr marL="0" lvl="0" indent="0" algn="l" rtl="0">
+              <a:spcBef>
+                <a:spcPts val="0"/>
+              </a:spcBef>
+              <a:spcAft>
+                <a:spcPts val="0"/>
+              </a:spcAft>
+              <a:buNone/>
+            </a:pPr>
+            <a:endParaRPr dirty="0"/>
+          </a:p>
+        </p:txBody>
+      </p:sp>
+      <p:sp>
+        <p:nvSpPr>
+          <p:cNvPr id="187" name="Google Shape;187;p8:notes"/>
+          <p:cNvSpPr txBox="1">
+            <a:spLocks noGrp="1"/>
+          </p:cNvSpPr>
+          <p:nvPr>
+            <p:ph type="sldNum" idx="12"/>
+          </p:nvPr>
+        </p:nvSpPr>
+        <p:spPr>
+          <a:xfrm>
+            <a:off x="3884613" y="8685213"/>
+            <a:ext cx="2971800" cy="458787"/>
+          </a:xfrm>
+          <a:prstGeom prst="rect">
+            <a:avLst/>
+          </a:prstGeom>
+          <a:noFill/>
+          <a:ln>
+            <a:noFill/>
+          </a:ln>
+        </p:spPr>
+        <p:txBody>
+          <a:bodyPr spcFirstLastPara="1" wrap="square" lIns="91425" tIns="45700" rIns="91425" bIns="45700" anchor="b" anchorCtr="0">
+            <a:noAutofit/>
+          </a:bodyPr>
+          <a:lstStyle/>
+          <a:p>
+            <a:pPr marL="0" lvl="0" indent="0" algn="r" rtl="0">
+              <a:spcBef>
+                <a:spcPts val="0"/>
+              </a:spcBef>
+              <a:spcAft>
+                <a:spcPts val="0"/>
+              </a:spcAft>
+              <a:buNone/>
+            </a:pPr>
+            <a:fld id="{00000000-1234-1234-1234-123412341234}" type="slidenum">
+              <a:rPr lang="en-US"/>
+              <a:t>15</a:t>
+            </a:fld>
+            <a:endParaRPr/>
+          </a:p>
+        </p:txBody>
+      </p:sp>
+    </p:spTree>
+    <p:extLst>
+      <p:ext uri="{BB962C8B-B14F-4D97-AF65-F5344CB8AC3E}">
+        <p14:creationId xmlns:p14="http://schemas.microsoft.com/office/powerpoint/2010/main" val="3146247769"/>
+      </p:ext>
+    </p:extLst>
+  </p:cSld>
+  <p:clrMapOvr>
+    <a:masterClrMapping/>
+  </p:clrMapOvr>
+</p:notes>
+</file>
+
+<file path=ppt/notesSlides/notesSlide16.xml><?xml version="1.0" encoding="utf-8"?>
 <p:notes xmlns:a="http://schemas.openxmlformats.org/drawingml/2006/main" xmlns:r="http://schemas.openxmlformats.org/officeDocument/2006/relationships" xmlns:p="http://schemas.openxmlformats.org/presentationml/2006/main" showMasterSp="0" showMasterPhAnim="0">
   <p:cSld>
     <p:spTree>
@@ -2325,7 +3005,7 @@
                 <a:cs typeface="Calibri"/>
                 <a:sym typeface="Calibri"/>
               </a:rPr>
-              <a:t>12</a:t>
+              <a:t>16</a:t>
             </a:fld>
             <a:endParaRPr sz="1200">
               <a:solidFill>
@@ -2352,12 +3032,12 @@
 </p:notes>
 </file>
 
-<file path=ppt/notesSlides/notesSlide13.xml><?xml version="1.0" encoding="utf-8"?>
+<file path=ppt/notesSlides/notesSlide17.xml><?xml version="1.0" encoding="utf-8"?>
 <p:notes xmlns:a="http://schemas.openxmlformats.org/drawingml/2006/main" xmlns:r="http://schemas.openxmlformats.org/officeDocument/2006/relationships" xmlns:p="http://schemas.openxmlformats.org/presentationml/2006/main" showMasterSp="0" showMasterPhAnim="0">
   <p:cSld>
     <p:spTree>
       <p:nvGrpSpPr>
-        <p:cNvPr id="1" name="Shape 336"/>
+        <p:cNvPr id="1" name="Shape 184"/>
         <p:cNvGrpSpPr/>
         <p:nvPr/>
       </p:nvGrpSpPr>
@@ -2371,7 +3051,7 @@
       </p:grpSpPr>
       <p:sp>
         <p:nvSpPr>
-          <p:cNvPr id="337" name="Google Shape;337;p23:notes"/>
+          <p:cNvPr id="185" name="Google Shape;185;p8:notes"/>
           <p:cNvSpPr>
             <a:spLocks noGrp="1" noRot="1" noChangeAspect="1"/>
           </p:cNvSpPr>
@@ -2422,7 +3102,7 @@
       </p:sp>
       <p:sp>
         <p:nvSpPr>
-          <p:cNvPr id="338" name="Google Shape;338;p23:notes"/>
+          <p:cNvPr id="186" name="Google Shape;186;p8:notes"/>
           <p:cNvSpPr txBox="1">
             <a:spLocks noGrp="1"/>
           </p:cNvSpPr>
@@ -2458,13 +3138,13 @@
               </a:spcAft>
               <a:buNone/>
             </a:pPr>
-            <a:endParaRPr/>
+            <a:endParaRPr dirty="0"/>
           </a:p>
         </p:txBody>
       </p:sp>
       <p:sp>
         <p:nvSpPr>
-          <p:cNvPr id="339" name="Google Shape;339;p23:notes"/>
+          <p:cNvPr id="187" name="Google Shape;187;p8:notes"/>
           <p:cNvSpPr txBox="1">
             <a:spLocks noGrp="1"/>
           </p:cNvSpPr>
@@ -2502,7 +3182,7 @@
             </a:pPr>
             <a:fld id="{00000000-1234-1234-1234-123412341234}" type="slidenum">
               <a:rPr lang="en-US"/>
-              <a:t>13</a:t>
+              <a:t>17</a:t>
             </a:fld>
             <a:endParaRPr/>
           </a:p>
@@ -2511,7 +3191,7 @@
     </p:spTree>
     <p:extLst>
       <p:ext uri="{BB962C8B-B14F-4D97-AF65-F5344CB8AC3E}">
-        <p14:creationId xmlns:p14="http://schemas.microsoft.com/office/powerpoint/2010/main" val="4080850536"/>
+        <p14:creationId xmlns:p14="http://schemas.microsoft.com/office/powerpoint/2010/main" val="4096084241"/>
       </p:ext>
     </p:extLst>
   </p:cSld>
@@ -2521,7 +3201,7 @@
 </p:notes>
 </file>
 
-<file path=ppt/notesSlides/notesSlide14.xml><?xml version="1.0" encoding="utf-8"?>
+<file path=ppt/notesSlides/notesSlide18.xml><?xml version="1.0" encoding="utf-8"?>
 <p:notes xmlns:a="http://schemas.openxmlformats.org/drawingml/2006/main" xmlns:r="http://schemas.openxmlformats.org/officeDocument/2006/relationships" xmlns:p="http://schemas.openxmlformats.org/presentationml/2006/main" showMasterSp="0" showMasterPhAnim="0">
   <p:cSld>
     <p:spTree>
@@ -2675,7 +3355,7 @@
             </a:pPr>
             <a:fld id="{00000000-1234-1234-1234-123412341234}" type="slidenum">
               <a:rPr lang="en-US"/>
-              <a:t>14</a:t>
+              <a:t>18</a:t>
             </a:fld>
             <a:endParaRPr/>
           </a:p>
@@ -4559,7 +5239,7 @@
   <p:cSld>
     <p:spTree>
       <p:nvGrpSpPr>
-        <p:cNvPr id="1" name="Shape 192"/>
+        <p:cNvPr id="1" name="Shape 184"/>
         <p:cNvGrpSpPr/>
         <p:nvPr/>
       </p:nvGrpSpPr>
@@ -4573,7 +5253,7 @@
       </p:grpSpPr>
       <p:sp>
         <p:nvSpPr>
-          <p:cNvPr id="193" name="Google Shape;193;p9:notes"/>
+          <p:cNvPr id="185" name="Google Shape;185;p8:notes"/>
           <p:cNvSpPr>
             <a:spLocks noGrp="1" noRot="1" noChangeAspect="1"/>
           </p:cNvSpPr>
@@ -4624,7 +5304,7 @@
       </p:sp>
       <p:sp>
         <p:nvSpPr>
-          <p:cNvPr id="194" name="Google Shape;194;p9:notes"/>
+          <p:cNvPr id="186" name="Google Shape;186;p8:notes"/>
           <p:cNvSpPr txBox="1">
             <a:spLocks noGrp="1"/>
           </p:cNvSpPr>
@@ -4660,81 +5340,13 @@
               </a:spcAft>
               <a:buNone/>
             </a:pPr>
-            <a:r>
-              <a:rPr lang="en-US"/>
-              <a:t>There are some points to be noted from the categorical variables</a:t>
-            </a:r>
-            <a:endParaRPr/>
-          </a:p>
-          <a:p>
-            <a:pPr marL="0" lvl="0" indent="0" algn="l" rtl="0">
-              <a:spcBef>
-                <a:spcPts val="0"/>
-              </a:spcBef>
-              <a:spcAft>
-                <a:spcPts val="0"/>
-              </a:spcAft>
-              <a:buNone/>
-            </a:pPr>
-            <a:r>
-              <a:rPr lang="en-US"/>
-              <a:t>1.  </a:t>
-            </a:r>
-            <a:endParaRPr/>
-          </a:p>
-          <a:p>
-            <a:pPr marL="0" lvl="0" indent="0" algn="l" rtl="0">
-              <a:spcBef>
-                <a:spcPts val="0"/>
-              </a:spcBef>
-              <a:spcAft>
-                <a:spcPts val="0"/>
-              </a:spcAft>
-              <a:buNone/>
-            </a:pPr>
-            <a:r>
-              <a:rPr lang="en-US"/>
-              <a:t>2. </a:t>
-            </a:r>
-            <a:endParaRPr/>
-          </a:p>
-          <a:p>
-            <a:pPr marL="0" lvl="0" indent="0" algn="l" rtl="0">
-              <a:spcBef>
-                <a:spcPts val="0"/>
-              </a:spcBef>
-              <a:spcAft>
-                <a:spcPts val="0"/>
-              </a:spcAft>
-              <a:buNone/>
-            </a:pPr>
-            <a:r>
-              <a:rPr lang="en-US"/>
-              <a:t>3. </a:t>
-            </a:r>
-            <a:endParaRPr/>
-          </a:p>
-          <a:p>
-            <a:pPr marL="0" lvl="0" indent="0" algn="l" rtl="0">
-              <a:spcBef>
-                <a:spcPts val="0"/>
-              </a:spcBef>
-              <a:spcAft>
-                <a:spcPts val="0"/>
-              </a:spcAft>
-              <a:buNone/>
-            </a:pPr>
-            <a:r>
-              <a:rPr lang="en-US"/>
-              <a:t>4. </a:t>
-            </a:r>
-            <a:endParaRPr/>
+            <a:endParaRPr dirty="0"/>
           </a:p>
         </p:txBody>
       </p:sp>
       <p:sp>
         <p:nvSpPr>
-          <p:cNvPr id="195" name="Google Shape;195;p9:notes"/>
+          <p:cNvPr id="187" name="Google Shape;187;p8:notes"/>
           <p:cNvSpPr txBox="1">
             <a:spLocks noGrp="1"/>
           </p:cNvSpPr>
@@ -4781,7 +5393,7 @@
     </p:spTree>
     <p:extLst>
       <p:ext uri="{BB962C8B-B14F-4D97-AF65-F5344CB8AC3E}">
-        <p14:creationId xmlns:p14="http://schemas.microsoft.com/office/powerpoint/2010/main" val="3138168327"/>
+        <p14:creationId xmlns:p14="http://schemas.microsoft.com/office/powerpoint/2010/main" val="3245713645"/>
       </p:ext>
     </p:extLst>
   </p:cSld>
@@ -15379,17 +15991,9 @@
 <file path=ppt/slides/slide10.xml><?xml version="1.0" encoding="utf-8"?>
 <p:sld xmlns:a="http://schemas.openxmlformats.org/drawingml/2006/main" xmlns:r="http://schemas.openxmlformats.org/officeDocument/2006/relationships" xmlns:p="http://schemas.openxmlformats.org/presentationml/2006/main" showMasterSp="0">
   <p:cSld>
-    <p:bg>
-      <p:bgPr>
-        <a:solidFill>
-          <a:schemeClr val="dk1"/>
-        </a:solidFill>
-        <a:effectLst/>
-      </p:bgPr>
-    </p:bg>
     <p:spTree>
       <p:nvGrpSpPr>
-        <p:cNvPr id="1" name="Shape 241"/>
+        <p:cNvPr id="1" name="Shape 188"/>
         <p:cNvGrpSpPr/>
         <p:nvPr/>
       </p:nvGrpSpPr>
@@ -15403,18 +16007,18 @@
       </p:grpSpPr>
       <p:sp>
         <p:nvSpPr>
-          <p:cNvPr id="242" name="Google Shape;242;p15"/>
+          <p:cNvPr id="189" name="Google Shape;189;p8"/>
           <p:cNvSpPr txBox="1">
             <a:spLocks noGrp="1"/>
           </p:cNvSpPr>
           <p:nvPr>
-            <p:ph type="title"/>
+            <p:ph type="body" idx="1"/>
           </p:nvPr>
         </p:nvSpPr>
         <p:spPr>
           <a:xfrm>
-            <a:off x="762000" y="7107"/>
-            <a:ext cx="10498930" cy="1359380"/>
+            <a:off x="5693658" y="1099536"/>
+            <a:ext cx="5526661" cy="925909"/>
           </a:xfrm>
           <a:prstGeom prst="rect">
             <a:avLst/>
@@ -15425,48 +16029,70 @@
           </a:ln>
         </p:spPr>
         <p:txBody>
-          <a:bodyPr spcFirstLastPara="1" wrap="square" lIns="91425" tIns="45700" rIns="91425" bIns="45700" anchor="ctr" anchorCtr="0">
+          <a:bodyPr spcFirstLastPara="1" wrap="square" lIns="91425" tIns="45700" rIns="91425" bIns="45700" anchor="t" anchorCtr="0">
             <a:normAutofit/>
           </a:bodyPr>
           <a:lstStyle/>
           <a:p>
-            <a:pPr marL="0" lvl="0" indent="0" algn="ctr" rtl="0">
-              <a:lnSpc>
-                <a:spcPct val="90000"/>
-              </a:lnSpc>
-              <a:spcBef>
-                <a:spcPts val="0"/>
-              </a:spcBef>
-              <a:spcAft>
-                <a:spcPts val="0"/>
-              </a:spcAft>
-              <a:buClr>
-                <a:schemeClr val="lt1"/>
-              </a:buClr>
-              <a:buSzPts val="4400"/>
-              <a:buFont typeface="Calibri"/>
-              <a:buNone/>
+            <a:pPr marL="0" marR="0">
+              <a:lnSpc>
+                <a:spcPct val="115000"/>
+              </a:lnSpc>
+              <a:spcBef>
+                <a:spcPts val="0"/>
+              </a:spcBef>
+              <a:spcAft>
+                <a:spcPts val="0"/>
+              </a:spcAft>
             </a:pPr>
             <a:r>
-              <a:rPr lang="en-US" b="1" dirty="0"/>
-              <a:t>Missing and Unknown Value</a:t>
+              <a:rPr lang="en-US" sz="2800" dirty="0">
+                <a:effectLst/>
+                <a:latin typeface="Times New Roman" panose="02020603050405020304" pitchFamily="18" charset="0"/>
+                <a:ea typeface="Times New Roman" panose="02020603050405020304" pitchFamily="18" charset="0"/>
+              </a:rPr>
+              <a:t>Imbalance Data: Over Sampling</a:t>
             </a:r>
-            <a:endParaRPr dirty="0"/>
           </a:p>
         </p:txBody>
       </p:sp>
+      <p:pic>
+        <p:nvPicPr>
+          <p:cNvPr id="190" name="Google Shape;190;p8"/>
+          <p:cNvPicPr preferRelativeResize="0"/>
+          <p:nvPr/>
+        </p:nvPicPr>
+        <p:blipFill rotWithShape="1">
+          <a:blip r:embed="rId3">
+            <a:alphaModFix/>
+          </a:blip>
+          <a:srcRect b="320"/>
+          <a:stretch/>
+        </p:blipFill>
+        <p:spPr>
+          <a:xfrm rot="10799999">
+            <a:off x="711040" y="1575974"/>
+            <a:ext cx="4105765" cy="4114519"/>
+          </a:xfrm>
+          <a:prstGeom prst="rect">
+            <a:avLst/>
+          </a:prstGeom>
+          <a:noFill/>
+          <a:ln>
+            <a:noFill/>
+          </a:ln>
+        </p:spPr>
+      </p:pic>
       <p:sp>
         <p:nvSpPr>
-          <p:cNvPr id="3" name="Google Shape;242;p15"/>
-          <p:cNvSpPr txBox="1">
-            <a:spLocks/>
-          </p:cNvSpPr>
+          <p:cNvPr id="191" name="Google Shape;191;p8"/>
+          <p:cNvSpPr txBox="1"/>
           <p:nvPr/>
         </p:nvSpPr>
         <p:spPr>
           <a:xfrm>
-            <a:off x="600500" y="1366487"/>
-            <a:ext cx="11378139" cy="5299597"/>
+            <a:off x="1104642" y="2832450"/>
+            <a:ext cx="3402347" cy="1477328"/>
           </a:xfrm>
           <a:prstGeom prst="rect">
             <a:avLst/>
@@ -15477,281 +16103,68 @@
           </a:ln>
         </p:spPr>
         <p:txBody>
-          <a:bodyPr spcFirstLastPara="1" wrap="square" lIns="91425" tIns="45700" rIns="91425" bIns="45700" anchor="ctr" anchorCtr="0">
-            <a:normAutofit/>
+          <a:bodyPr spcFirstLastPara="1" wrap="square" lIns="0" tIns="0" rIns="0" bIns="0" anchor="t" anchorCtr="0">
+            <a:spAutoFit/>
           </a:bodyPr>
-          <a:lstStyle>
-            <a:defPPr marR="0" lvl="0" algn="l" rtl="0">
-              <a:lnSpc>
-                <a:spcPct val="100000"/>
-              </a:lnSpc>
-              <a:spcBef>
-                <a:spcPts val="0"/>
-              </a:spcBef>
-              <a:spcAft>
-                <a:spcPts val="0"/>
-              </a:spcAft>
-            </a:defPPr>
-            <a:lvl1pPr marR="0" lvl="0" algn="l" rtl="0">
-              <a:lnSpc>
-                <a:spcPct val="90000"/>
-              </a:lnSpc>
-              <a:spcBef>
-                <a:spcPts val="0"/>
-              </a:spcBef>
-              <a:spcAft>
-                <a:spcPts val="0"/>
-              </a:spcAft>
-              <a:buClr>
-                <a:schemeClr val="lt1"/>
-              </a:buClr>
-              <a:buSzPts val="1800"/>
-              <a:buFont typeface="Calibri"/>
-              <a:buNone/>
-              <a:defRPr sz="4400" b="0" i="0" u="none" strike="noStrike" cap="none">
-                <a:solidFill>
-                  <a:schemeClr val="lt1"/>
-                </a:solidFill>
-                <a:latin typeface="Calibri"/>
-                <a:ea typeface="Calibri"/>
-                <a:cs typeface="Calibri"/>
-                <a:sym typeface="Calibri"/>
-              </a:defRPr>
-            </a:lvl1pPr>
-            <a:lvl2pPr marR="0" lvl="1" algn="l" rtl="0">
-              <a:lnSpc>
-                <a:spcPct val="100000"/>
-              </a:lnSpc>
-              <a:spcBef>
-                <a:spcPts val="0"/>
-              </a:spcBef>
-              <a:spcAft>
-                <a:spcPts val="0"/>
-              </a:spcAft>
-              <a:buClr>
-                <a:srgbClr val="000000"/>
-              </a:buClr>
-              <a:buSzPts val="1400"/>
-              <a:buFont typeface="Arial"/>
-              <a:buNone/>
-              <a:defRPr sz="1800" b="0" i="0" u="none" strike="noStrike" cap="none">
-                <a:solidFill>
-                  <a:srgbClr val="000000"/>
-                </a:solidFill>
-                <a:latin typeface="Arial"/>
-                <a:ea typeface="Arial"/>
-                <a:cs typeface="Arial"/>
-                <a:sym typeface="Arial"/>
-              </a:defRPr>
-            </a:lvl2pPr>
-            <a:lvl3pPr marR="0" lvl="2" algn="l" rtl="0">
-              <a:lnSpc>
-                <a:spcPct val="100000"/>
-              </a:lnSpc>
-              <a:spcBef>
-                <a:spcPts val="0"/>
-              </a:spcBef>
-              <a:spcAft>
-                <a:spcPts val="0"/>
-              </a:spcAft>
-              <a:buClr>
-                <a:srgbClr val="000000"/>
-              </a:buClr>
-              <a:buSzPts val="1400"/>
-              <a:buFont typeface="Arial"/>
-              <a:buNone/>
-              <a:defRPr sz="1800" b="0" i="0" u="none" strike="noStrike" cap="none">
-                <a:solidFill>
-                  <a:srgbClr val="000000"/>
-                </a:solidFill>
-                <a:latin typeface="Arial"/>
-                <a:ea typeface="Arial"/>
-                <a:cs typeface="Arial"/>
-                <a:sym typeface="Arial"/>
-              </a:defRPr>
-            </a:lvl3pPr>
-            <a:lvl4pPr marR="0" lvl="3" algn="l" rtl="0">
-              <a:lnSpc>
-                <a:spcPct val="100000"/>
-              </a:lnSpc>
-              <a:spcBef>
-                <a:spcPts val="0"/>
-              </a:spcBef>
-              <a:spcAft>
-                <a:spcPts val="0"/>
-              </a:spcAft>
-              <a:buClr>
-                <a:srgbClr val="000000"/>
-              </a:buClr>
-              <a:buSzPts val="1400"/>
-              <a:buFont typeface="Arial"/>
-              <a:buNone/>
-              <a:defRPr sz="1800" b="0" i="0" u="none" strike="noStrike" cap="none">
-                <a:solidFill>
-                  <a:srgbClr val="000000"/>
-                </a:solidFill>
-                <a:latin typeface="Arial"/>
-                <a:ea typeface="Arial"/>
-                <a:cs typeface="Arial"/>
-                <a:sym typeface="Arial"/>
-              </a:defRPr>
-            </a:lvl4pPr>
-            <a:lvl5pPr marR="0" lvl="4" algn="l" rtl="0">
-              <a:lnSpc>
-                <a:spcPct val="100000"/>
-              </a:lnSpc>
-              <a:spcBef>
-                <a:spcPts val="0"/>
-              </a:spcBef>
-              <a:spcAft>
-                <a:spcPts val="0"/>
-              </a:spcAft>
-              <a:buClr>
-                <a:srgbClr val="000000"/>
-              </a:buClr>
-              <a:buSzPts val="1400"/>
-              <a:buFont typeface="Arial"/>
-              <a:buNone/>
-              <a:defRPr sz="1800" b="0" i="0" u="none" strike="noStrike" cap="none">
-                <a:solidFill>
-                  <a:srgbClr val="000000"/>
-                </a:solidFill>
-                <a:latin typeface="Arial"/>
-                <a:ea typeface="Arial"/>
-                <a:cs typeface="Arial"/>
-                <a:sym typeface="Arial"/>
-              </a:defRPr>
-            </a:lvl5pPr>
-            <a:lvl6pPr marR="0" lvl="5" algn="l" rtl="0">
-              <a:lnSpc>
-                <a:spcPct val="100000"/>
-              </a:lnSpc>
-              <a:spcBef>
-                <a:spcPts val="0"/>
-              </a:spcBef>
-              <a:spcAft>
-                <a:spcPts val="0"/>
-              </a:spcAft>
-              <a:buClr>
-                <a:srgbClr val="000000"/>
-              </a:buClr>
-              <a:buSzPts val="1400"/>
-              <a:buFont typeface="Arial"/>
-              <a:buNone/>
-              <a:defRPr sz="1800" b="0" i="0" u="none" strike="noStrike" cap="none">
-                <a:solidFill>
-                  <a:srgbClr val="000000"/>
-                </a:solidFill>
-                <a:latin typeface="Arial"/>
-                <a:ea typeface="Arial"/>
-                <a:cs typeface="Arial"/>
-                <a:sym typeface="Arial"/>
-              </a:defRPr>
-            </a:lvl6pPr>
-            <a:lvl7pPr marR="0" lvl="6" algn="l" rtl="0">
-              <a:lnSpc>
-                <a:spcPct val="100000"/>
-              </a:lnSpc>
-              <a:spcBef>
-                <a:spcPts val="0"/>
-              </a:spcBef>
-              <a:spcAft>
-                <a:spcPts val="0"/>
-              </a:spcAft>
-              <a:buClr>
-                <a:srgbClr val="000000"/>
-              </a:buClr>
-              <a:buSzPts val="1400"/>
-              <a:buFont typeface="Arial"/>
-              <a:buNone/>
-              <a:defRPr sz="1800" b="0" i="0" u="none" strike="noStrike" cap="none">
-                <a:solidFill>
-                  <a:srgbClr val="000000"/>
-                </a:solidFill>
-                <a:latin typeface="Arial"/>
-                <a:ea typeface="Arial"/>
-                <a:cs typeface="Arial"/>
-                <a:sym typeface="Arial"/>
-              </a:defRPr>
-            </a:lvl7pPr>
-            <a:lvl8pPr marR="0" lvl="7" algn="l" rtl="0">
-              <a:lnSpc>
-                <a:spcPct val="100000"/>
-              </a:lnSpc>
-              <a:spcBef>
-                <a:spcPts val="0"/>
-              </a:spcBef>
-              <a:spcAft>
-                <a:spcPts val="0"/>
-              </a:spcAft>
-              <a:buClr>
-                <a:srgbClr val="000000"/>
-              </a:buClr>
-              <a:buSzPts val="1400"/>
-              <a:buFont typeface="Arial"/>
-              <a:buNone/>
-              <a:defRPr sz="1800" b="0" i="0" u="none" strike="noStrike" cap="none">
-                <a:solidFill>
-                  <a:srgbClr val="000000"/>
-                </a:solidFill>
-                <a:latin typeface="Arial"/>
-                <a:ea typeface="Arial"/>
-                <a:cs typeface="Arial"/>
-                <a:sym typeface="Arial"/>
-              </a:defRPr>
-            </a:lvl8pPr>
-            <a:lvl9pPr marR="0" lvl="8" algn="l" rtl="0">
-              <a:lnSpc>
-                <a:spcPct val="100000"/>
-              </a:lnSpc>
-              <a:spcBef>
-                <a:spcPts val="0"/>
-              </a:spcBef>
-              <a:spcAft>
-                <a:spcPts val="0"/>
-              </a:spcAft>
-              <a:buClr>
-                <a:srgbClr val="000000"/>
-              </a:buClr>
-              <a:buSzPts val="1400"/>
-              <a:buFont typeface="Arial"/>
-              <a:buNone/>
-              <a:defRPr sz="1800" b="0" i="0" u="none" strike="noStrike" cap="none">
-                <a:solidFill>
-                  <a:srgbClr val="000000"/>
-                </a:solidFill>
-                <a:latin typeface="Arial"/>
-                <a:ea typeface="Arial"/>
-                <a:cs typeface="Arial"/>
-                <a:sym typeface="Arial"/>
-              </a:defRPr>
-            </a:lvl9pPr>
-          </a:lstStyle>
-          <a:p>
-            <a:pPr marL="571500" indent="-571500">
-              <a:buSzPts val="4400"/>
-              <a:buFont typeface="Arial" panose="020B0604020202020204" pitchFamily="34" charset="0"/>
-              <a:buChar char="•"/>
+          <a:lstStyle/>
+          <a:p>
+            <a:pPr marL="0" marR="0" lvl="0" indent="0" algn="ctr" rtl="0">
+              <a:spcBef>
+                <a:spcPts val="0"/>
+              </a:spcBef>
+              <a:spcAft>
+                <a:spcPts val="0"/>
+              </a:spcAft>
+              <a:buNone/>
             </a:pPr>
             <a:r>
-              <a:rPr lang="en-US" dirty="0"/>
-              <a:t>In our dataset, we don’t have any missing value</a:t>
+              <a:rPr lang="en-US" sz="4800" b="1" dirty="0">
+                <a:solidFill>
+                  <a:srgbClr val="FFC000"/>
+                </a:solidFill>
+              </a:rPr>
+              <a:t>Model Preparation</a:t>
             </a:r>
-          </a:p>
-          <a:p>
-            <a:pPr marL="571500" indent="-571500">
-              <a:buSzPts val="4400"/>
-              <a:buFont typeface="Arial" panose="020B0604020202020204" pitchFamily="34" charset="0"/>
-              <a:buChar char="•"/>
-            </a:pPr>
-            <a:r>
-              <a:rPr lang="en-US" dirty="0"/>
-              <a:t>For the Unknown value, we found five feature (job, education, default, housing and loan). Row number is relatively small so we dropped those rows.</a:t>
-            </a:r>
+            <a:endParaRPr dirty="0"/>
           </a:p>
         </p:txBody>
       </p:sp>
+      <p:pic>
+        <p:nvPicPr>
+          <p:cNvPr id="2" name="Picture 1">
+            <a:extLst>
+              <a:ext uri="{FF2B5EF4-FFF2-40B4-BE49-F238E27FC236}">
+                <a16:creationId xmlns:a16="http://schemas.microsoft.com/office/drawing/2014/main" id="{4F756C36-F987-FF43-6973-BA96FDD06C1B}"/>
+              </a:ext>
+            </a:extLst>
+          </p:cNvPr>
+          <p:cNvPicPr>
+            <a:picLocks noChangeAspect="1"/>
+          </p:cNvPicPr>
+          <p:nvPr/>
+        </p:nvPicPr>
+        <p:blipFill>
+          <a:blip r:embed="rId4"/>
+          <a:stretch>
+            <a:fillRect/>
+          </a:stretch>
+        </p:blipFill>
+        <p:spPr>
+          <a:xfrm>
+            <a:off x="5947536" y="2320413"/>
+            <a:ext cx="5152494" cy="3833554"/>
+          </a:xfrm>
+          <a:prstGeom prst="rect">
+            <a:avLst/>
+          </a:prstGeom>
+        </p:spPr>
+      </p:pic>
     </p:spTree>
+    <p:extLst>
+      <p:ext uri="{BB962C8B-B14F-4D97-AF65-F5344CB8AC3E}">
+        <p14:creationId xmlns:p14="http://schemas.microsoft.com/office/powerpoint/2010/main" val="1238791082"/>
+      </p:ext>
+    </p:extLst>
   </p:cSld>
   <p:clrMapOvr>
     <a:masterClrMapping/>
@@ -15762,17 +16175,9 @@
 <file path=ppt/slides/slide11.xml><?xml version="1.0" encoding="utf-8"?>
 <p:sld xmlns:a="http://schemas.openxmlformats.org/drawingml/2006/main" xmlns:r="http://schemas.openxmlformats.org/officeDocument/2006/relationships" xmlns:p="http://schemas.openxmlformats.org/presentationml/2006/main" showMasterSp="0">
   <p:cSld>
-    <p:bg>
-      <p:bgPr>
-        <a:solidFill>
-          <a:schemeClr val="dk1"/>
-        </a:solidFill>
-        <a:effectLst/>
-      </p:bgPr>
-    </p:bg>
     <p:spTree>
       <p:nvGrpSpPr>
-        <p:cNvPr id="1" name="Shape 241"/>
+        <p:cNvPr id="1" name="Shape 188"/>
         <p:cNvGrpSpPr/>
         <p:nvPr/>
       </p:nvGrpSpPr>
@@ -15786,18 +16191,18 @@
       </p:grpSpPr>
       <p:sp>
         <p:nvSpPr>
-          <p:cNvPr id="242" name="Google Shape;242;p15"/>
+          <p:cNvPr id="189" name="Google Shape;189;p8"/>
           <p:cNvSpPr txBox="1">
             <a:spLocks noGrp="1"/>
           </p:cNvSpPr>
           <p:nvPr>
-            <p:ph type="title"/>
+            <p:ph type="body" idx="1"/>
           </p:nvPr>
         </p:nvSpPr>
         <p:spPr>
           <a:xfrm>
-            <a:off x="762000" y="7107"/>
-            <a:ext cx="10498930" cy="1359380"/>
+            <a:off x="5693658" y="1099536"/>
+            <a:ext cx="5526661" cy="5124283"/>
           </a:xfrm>
           <a:prstGeom prst="rect">
             <a:avLst/>
@@ -15808,48 +16213,227 @@
           </a:ln>
         </p:spPr>
         <p:txBody>
-          <a:bodyPr spcFirstLastPara="1" wrap="square" lIns="91425" tIns="45700" rIns="91425" bIns="45700" anchor="ctr" anchorCtr="0">
-            <a:normAutofit/>
+          <a:bodyPr spcFirstLastPara="1" wrap="square" lIns="91425" tIns="45700" rIns="91425" bIns="45700" anchor="t" anchorCtr="0">
+            <a:normAutofit fontScale="92500"/>
           </a:bodyPr>
           <a:lstStyle/>
           <a:p>
-            <a:pPr marL="0" lvl="0" indent="0" algn="ctr" rtl="0">
-              <a:lnSpc>
-                <a:spcPct val="90000"/>
-              </a:lnSpc>
-              <a:spcBef>
-                <a:spcPts val="0"/>
-              </a:spcBef>
-              <a:spcAft>
-                <a:spcPts val="0"/>
-              </a:spcAft>
-              <a:buClr>
-                <a:schemeClr val="lt1"/>
-              </a:buClr>
-              <a:buSzPts val="4400"/>
-              <a:buFont typeface="Calibri"/>
+            <a:pPr marL="0" marR="0" indent="0">
+              <a:lnSpc>
+                <a:spcPct val="115000"/>
+              </a:lnSpc>
+              <a:spcBef>
+                <a:spcPts val="0"/>
+              </a:spcBef>
+              <a:spcAft>
+                <a:spcPts val="0"/>
+              </a:spcAft>
               <a:buNone/>
             </a:pPr>
             <a:r>
-              <a:rPr lang="en-US" b="1" dirty="0"/>
-              <a:t>Handle outlier</a:t>
+              <a:rPr lang="en-US" sz="2800" dirty="0">
+                <a:effectLst/>
+                <a:latin typeface="Times New Roman" panose="02020603050405020304" pitchFamily="18" charset="0"/>
+                <a:ea typeface="Times New Roman" panose="02020603050405020304" pitchFamily="18" charset="0"/>
+              </a:rPr>
+              <a:t>Random Forest</a:t>
             </a:r>
-            <a:endParaRPr dirty="0"/>
+          </a:p>
+          <a:p>
+            <a:pPr marL="0" marR="0" indent="0">
+              <a:lnSpc>
+                <a:spcPct val="115000"/>
+              </a:lnSpc>
+              <a:spcBef>
+                <a:spcPts val="0"/>
+              </a:spcBef>
+              <a:spcAft>
+                <a:spcPts val="0"/>
+              </a:spcAft>
+              <a:buNone/>
+            </a:pPr>
+            <a:r>
+              <a:rPr lang="en-US" sz="2800" dirty="0">
+                <a:effectLst/>
+                <a:latin typeface="Times New Roman" panose="02020603050405020304" pitchFamily="18" charset="0"/>
+                <a:ea typeface="Times New Roman" panose="02020603050405020304" pitchFamily="18" charset="0"/>
+              </a:rPr>
+              <a:t>The process of this method is: </a:t>
+            </a:r>
+          </a:p>
+          <a:p>
+            <a:pPr marL="514350" marR="0" indent="-514350">
+              <a:lnSpc>
+                <a:spcPct val="115000"/>
+              </a:lnSpc>
+              <a:spcBef>
+                <a:spcPts val="0"/>
+              </a:spcBef>
+              <a:spcAft>
+                <a:spcPts val="0"/>
+              </a:spcAft>
+              <a:buFont typeface="+mj-lt"/>
+              <a:buAutoNum type="arabicPeriod"/>
+            </a:pPr>
+            <a:r>
+              <a:rPr lang="en-US" sz="2800" dirty="0">
+                <a:effectLst/>
+                <a:latin typeface="Times New Roman" panose="02020603050405020304" pitchFamily="18" charset="0"/>
+                <a:ea typeface="Times New Roman" panose="02020603050405020304" pitchFamily="18" charset="0"/>
+              </a:rPr>
+              <a:t>Take a sample of size n from the training dataset; </a:t>
+            </a:r>
+          </a:p>
+          <a:p>
+            <a:pPr marL="514350" marR="0" indent="-514350">
+              <a:lnSpc>
+                <a:spcPct val="115000"/>
+              </a:lnSpc>
+              <a:spcBef>
+                <a:spcPts val="0"/>
+              </a:spcBef>
+              <a:spcAft>
+                <a:spcPts val="0"/>
+              </a:spcAft>
+              <a:buFont typeface="+mj-lt"/>
+              <a:buAutoNum type="arabicPeriod"/>
+            </a:pPr>
+            <a:r>
+              <a:rPr lang="en-US" sz="2800" dirty="0">
+                <a:effectLst/>
+                <a:latin typeface="Times New Roman" panose="02020603050405020304" pitchFamily="18" charset="0"/>
+                <a:ea typeface="Times New Roman" panose="02020603050405020304" pitchFamily="18" charset="0"/>
+              </a:rPr>
+              <a:t>Randomly choose p variables from all the variables available; </a:t>
+            </a:r>
+          </a:p>
+          <a:p>
+            <a:pPr marL="514350" marR="0" indent="-514350">
+              <a:lnSpc>
+                <a:spcPct val="115000"/>
+              </a:lnSpc>
+              <a:spcBef>
+                <a:spcPts val="0"/>
+              </a:spcBef>
+              <a:spcAft>
+                <a:spcPts val="0"/>
+              </a:spcAft>
+              <a:buFont typeface="+mj-lt"/>
+              <a:buAutoNum type="arabicPeriod"/>
+            </a:pPr>
+            <a:r>
+              <a:rPr lang="en-US" sz="2800" dirty="0">
+                <a:effectLst/>
+                <a:latin typeface="Times New Roman" panose="02020603050405020304" pitchFamily="18" charset="0"/>
+                <a:ea typeface="Times New Roman" panose="02020603050405020304" pitchFamily="18" charset="0"/>
+              </a:rPr>
+              <a:t>Train a single big tree on the sample dataset and using p variables; </a:t>
+            </a:r>
+          </a:p>
+          <a:p>
+            <a:pPr marL="514350" marR="0" indent="-514350">
+              <a:lnSpc>
+                <a:spcPct val="115000"/>
+              </a:lnSpc>
+              <a:spcBef>
+                <a:spcPts val="0"/>
+              </a:spcBef>
+              <a:spcAft>
+                <a:spcPts val="0"/>
+              </a:spcAft>
+              <a:buFont typeface="+mj-lt"/>
+              <a:buAutoNum type="arabicPeriod"/>
+            </a:pPr>
+            <a:r>
+              <a:rPr lang="en-US" sz="2800" dirty="0">
+                <a:effectLst/>
+                <a:latin typeface="Times New Roman" panose="02020603050405020304" pitchFamily="18" charset="0"/>
+                <a:ea typeface="Times New Roman" panose="02020603050405020304" pitchFamily="18" charset="0"/>
+              </a:rPr>
+              <a:t>Repeat the step above B times; </a:t>
+            </a:r>
+          </a:p>
+          <a:p>
+            <a:pPr marL="514350" marR="0" indent="-514350">
+              <a:lnSpc>
+                <a:spcPct val="115000"/>
+              </a:lnSpc>
+              <a:spcBef>
+                <a:spcPts val="0"/>
+              </a:spcBef>
+              <a:spcAft>
+                <a:spcPts val="0"/>
+              </a:spcAft>
+              <a:buFont typeface="+mj-lt"/>
+              <a:buAutoNum type="arabicPeriod"/>
+            </a:pPr>
+            <a:r>
+              <a:rPr lang="en-US" sz="2800" dirty="0">
+                <a:effectLst/>
+                <a:latin typeface="Times New Roman" panose="02020603050405020304" pitchFamily="18" charset="0"/>
+                <a:ea typeface="Times New Roman" panose="02020603050405020304" pitchFamily="18" charset="0"/>
+              </a:rPr>
+              <a:t>Take a majority vote of the results for all of the B trees.</a:t>
+            </a:r>
+          </a:p>
+          <a:p>
+            <a:pPr marL="0" marR="0" indent="0">
+              <a:lnSpc>
+                <a:spcPct val="115000"/>
+              </a:lnSpc>
+              <a:spcBef>
+                <a:spcPts val="0"/>
+              </a:spcBef>
+              <a:spcAft>
+                <a:spcPts val="0"/>
+              </a:spcAft>
+              <a:buNone/>
+            </a:pPr>
+            <a:endParaRPr lang="en-US" sz="2800" dirty="0">
+              <a:effectLst/>
+              <a:latin typeface="Times New Roman" panose="02020603050405020304" pitchFamily="18" charset="0"/>
+              <a:ea typeface="Times New Roman" panose="02020603050405020304" pitchFamily="18" charset="0"/>
+            </a:endParaRPr>
           </a:p>
         </p:txBody>
       </p:sp>
+      <p:pic>
+        <p:nvPicPr>
+          <p:cNvPr id="190" name="Google Shape;190;p8"/>
+          <p:cNvPicPr preferRelativeResize="0"/>
+          <p:nvPr/>
+        </p:nvPicPr>
+        <p:blipFill rotWithShape="1">
+          <a:blip r:embed="rId3">
+            <a:alphaModFix/>
+          </a:blip>
+          <a:srcRect b="320"/>
+          <a:stretch/>
+        </p:blipFill>
+        <p:spPr>
+          <a:xfrm rot="10799999">
+            <a:off x="711040" y="1575974"/>
+            <a:ext cx="4105765" cy="4114519"/>
+          </a:xfrm>
+          <a:prstGeom prst="rect">
+            <a:avLst/>
+          </a:prstGeom>
+          <a:noFill/>
+          <a:ln>
+            <a:noFill/>
+          </a:ln>
+        </p:spPr>
+      </p:pic>
       <p:sp>
         <p:nvSpPr>
-          <p:cNvPr id="4" name="Google Shape;242;p15"/>
-          <p:cNvSpPr txBox="1">
-            <a:spLocks/>
-          </p:cNvSpPr>
+          <p:cNvPr id="191" name="Google Shape;191;p8"/>
+          <p:cNvSpPr txBox="1"/>
           <p:nvPr/>
         </p:nvSpPr>
         <p:spPr>
           <a:xfrm>
-            <a:off x="627796" y="1701703"/>
-            <a:ext cx="11177517" cy="3034069"/>
+            <a:off x="1104642" y="2832450"/>
+            <a:ext cx="3402347" cy="1477328"/>
           </a:xfrm>
           <a:prstGeom prst="rect">
             <a:avLst/>
@@ -15860,280 +16444,36 @@
           </a:ln>
         </p:spPr>
         <p:txBody>
-          <a:bodyPr spcFirstLastPara="1" wrap="square" lIns="91425" tIns="45700" rIns="91425" bIns="45700" anchor="ctr" anchorCtr="0">
-            <a:normAutofit/>
+          <a:bodyPr spcFirstLastPara="1" wrap="square" lIns="0" tIns="0" rIns="0" bIns="0" anchor="t" anchorCtr="0">
+            <a:spAutoFit/>
           </a:bodyPr>
-          <a:lstStyle>
-            <a:defPPr marR="0" lvl="0" algn="l" rtl="0">
-              <a:lnSpc>
-                <a:spcPct val="100000"/>
-              </a:lnSpc>
-              <a:spcBef>
-                <a:spcPts val="0"/>
-              </a:spcBef>
-              <a:spcAft>
-                <a:spcPts val="0"/>
-              </a:spcAft>
-            </a:defPPr>
-            <a:lvl1pPr marR="0" lvl="0" algn="l" rtl="0">
-              <a:lnSpc>
-                <a:spcPct val="90000"/>
-              </a:lnSpc>
-              <a:spcBef>
-                <a:spcPts val="0"/>
-              </a:spcBef>
-              <a:spcAft>
-                <a:spcPts val="0"/>
-              </a:spcAft>
-              <a:buClr>
-                <a:schemeClr val="lt1"/>
-              </a:buClr>
-              <a:buSzPts val="1800"/>
-              <a:buFont typeface="Calibri"/>
-              <a:buNone/>
-              <a:defRPr sz="4400" b="0" i="0" u="none" strike="noStrike" cap="none">
-                <a:solidFill>
-                  <a:schemeClr val="lt1"/>
-                </a:solidFill>
-                <a:latin typeface="Calibri"/>
-                <a:ea typeface="Calibri"/>
-                <a:cs typeface="Calibri"/>
-                <a:sym typeface="Calibri"/>
-              </a:defRPr>
-            </a:lvl1pPr>
-            <a:lvl2pPr marR="0" lvl="1" algn="l" rtl="0">
-              <a:lnSpc>
-                <a:spcPct val="100000"/>
-              </a:lnSpc>
-              <a:spcBef>
-                <a:spcPts val="0"/>
-              </a:spcBef>
-              <a:spcAft>
-                <a:spcPts val="0"/>
-              </a:spcAft>
-              <a:buClr>
-                <a:srgbClr val="000000"/>
-              </a:buClr>
-              <a:buSzPts val="1400"/>
-              <a:buFont typeface="Arial"/>
-              <a:buNone/>
-              <a:defRPr sz="1800" b="0" i="0" u="none" strike="noStrike" cap="none">
-                <a:solidFill>
-                  <a:srgbClr val="000000"/>
-                </a:solidFill>
-                <a:latin typeface="Arial"/>
-                <a:ea typeface="Arial"/>
-                <a:cs typeface="Arial"/>
-                <a:sym typeface="Arial"/>
-              </a:defRPr>
-            </a:lvl2pPr>
-            <a:lvl3pPr marR="0" lvl="2" algn="l" rtl="0">
-              <a:lnSpc>
-                <a:spcPct val="100000"/>
-              </a:lnSpc>
-              <a:spcBef>
-                <a:spcPts val="0"/>
-              </a:spcBef>
-              <a:spcAft>
-                <a:spcPts val="0"/>
-              </a:spcAft>
-              <a:buClr>
-                <a:srgbClr val="000000"/>
-              </a:buClr>
-              <a:buSzPts val="1400"/>
-              <a:buFont typeface="Arial"/>
-              <a:buNone/>
-              <a:defRPr sz="1800" b="0" i="0" u="none" strike="noStrike" cap="none">
-                <a:solidFill>
-                  <a:srgbClr val="000000"/>
-                </a:solidFill>
-                <a:latin typeface="Arial"/>
-                <a:ea typeface="Arial"/>
-                <a:cs typeface="Arial"/>
-                <a:sym typeface="Arial"/>
-              </a:defRPr>
-            </a:lvl3pPr>
-            <a:lvl4pPr marR="0" lvl="3" algn="l" rtl="0">
-              <a:lnSpc>
-                <a:spcPct val="100000"/>
-              </a:lnSpc>
-              <a:spcBef>
-                <a:spcPts val="0"/>
-              </a:spcBef>
-              <a:spcAft>
-                <a:spcPts val="0"/>
-              </a:spcAft>
-              <a:buClr>
-                <a:srgbClr val="000000"/>
-              </a:buClr>
-              <a:buSzPts val="1400"/>
-              <a:buFont typeface="Arial"/>
-              <a:buNone/>
-              <a:defRPr sz="1800" b="0" i="0" u="none" strike="noStrike" cap="none">
-                <a:solidFill>
-                  <a:srgbClr val="000000"/>
-                </a:solidFill>
-                <a:latin typeface="Arial"/>
-                <a:ea typeface="Arial"/>
-                <a:cs typeface="Arial"/>
-                <a:sym typeface="Arial"/>
-              </a:defRPr>
-            </a:lvl4pPr>
-            <a:lvl5pPr marR="0" lvl="4" algn="l" rtl="0">
-              <a:lnSpc>
-                <a:spcPct val="100000"/>
-              </a:lnSpc>
-              <a:spcBef>
-                <a:spcPts val="0"/>
-              </a:spcBef>
-              <a:spcAft>
-                <a:spcPts val="0"/>
-              </a:spcAft>
-              <a:buClr>
-                <a:srgbClr val="000000"/>
-              </a:buClr>
-              <a:buSzPts val="1400"/>
-              <a:buFont typeface="Arial"/>
-              <a:buNone/>
-              <a:defRPr sz="1800" b="0" i="0" u="none" strike="noStrike" cap="none">
-                <a:solidFill>
-                  <a:srgbClr val="000000"/>
-                </a:solidFill>
-                <a:latin typeface="Arial"/>
-                <a:ea typeface="Arial"/>
-                <a:cs typeface="Arial"/>
-                <a:sym typeface="Arial"/>
-              </a:defRPr>
-            </a:lvl5pPr>
-            <a:lvl6pPr marR="0" lvl="5" algn="l" rtl="0">
-              <a:lnSpc>
-                <a:spcPct val="100000"/>
-              </a:lnSpc>
-              <a:spcBef>
-                <a:spcPts val="0"/>
-              </a:spcBef>
-              <a:spcAft>
-                <a:spcPts val="0"/>
-              </a:spcAft>
-              <a:buClr>
-                <a:srgbClr val="000000"/>
-              </a:buClr>
-              <a:buSzPts val="1400"/>
-              <a:buFont typeface="Arial"/>
-              <a:buNone/>
-              <a:defRPr sz="1800" b="0" i="0" u="none" strike="noStrike" cap="none">
-                <a:solidFill>
-                  <a:srgbClr val="000000"/>
-                </a:solidFill>
-                <a:latin typeface="Arial"/>
-                <a:ea typeface="Arial"/>
-                <a:cs typeface="Arial"/>
-                <a:sym typeface="Arial"/>
-              </a:defRPr>
-            </a:lvl6pPr>
-            <a:lvl7pPr marR="0" lvl="6" algn="l" rtl="0">
-              <a:lnSpc>
-                <a:spcPct val="100000"/>
-              </a:lnSpc>
-              <a:spcBef>
-                <a:spcPts val="0"/>
-              </a:spcBef>
-              <a:spcAft>
-                <a:spcPts val="0"/>
-              </a:spcAft>
-              <a:buClr>
-                <a:srgbClr val="000000"/>
-              </a:buClr>
-              <a:buSzPts val="1400"/>
-              <a:buFont typeface="Arial"/>
-              <a:buNone/>
-              <a:defRPr sz="1800" b="0" i="0" u="none" strike="noStrike" cap="none">
-                <a:solidFill>
-                  <a:srgbClr val="000000"/>
-                </a:solidFill>
-                <a:latin typeface="Arial"/>
-                <a:ea typeface="Arial"/>
-                <a:cs typeface="Arial"/>
-                <a:sym typeface="Arial"/>
-              </a:defRPr>
-            </a:lvl7pPr>
-            <a:lvl8pPr marR="0" lvl="7" algn="l" rtl="0">
-              <a:lnSpc>
-                <a:spcPct val="100000"/>
-              </a:lnSpc>
-              <a:spcBef>
-                <a:spcPts val="0"/>
-              </a:spcBef>
-              <a:spcAft>
-                <a:spcPts val="0"/>
-              </a:spcAft>
-              <a:buClr>
-                <a:srgbClr val="000000"/>
-              </a:buClr>
-              <a:buSzPts val="1400"/>
-              <a:buFont typeface="Arial"/>
-              <a:buNone/>
-              <a:defRPr sz="1800" b="0" i="0" u="none" strike="noStrike" cap="none">
-                <a:solidFill>
-                  <a:srgbClr val="000000"/>
-                </a:solidFill>
-                <a:latin typeface="Arial"/>
-                <a:ea typeface="Arial"/>
-                <a:cs typeface="Arial"/>
-                <a:sym typeface="Arial"/>
-              </a:defRPr>
-            </a:lvl8pPr>
-            <a:lvl9pPr marR="0" lvl="8" algn="l" rtl="0">
-              <a:lnSpc>
-                <a:spcPct val="100000"/>
-              </a:lnSpc>
-              <a:spcBef>
-                <a:spcPts val="0"/>
-              </a:spcBef>
-              <a:spcAft>
-                <a:spcPts val="0"/>
-              </a:spcAft>
-              <a:buClr>
-                <a:srgbClr val="000000"/>
-              </a:buClr>
-              <a:buSzPts val="1400"/>
-              <a:buFont typeface="Arial"/>
-              <a:buNone/>
-              <a:defRPr sz="1800" b="0" i="0" u="none" strike="noStrike" cap="none">
-                <a:solidFill>
-                  <a:srgbClr val="000000"/>
-                </a:solidFill>
-                <a:latin typeface="Arial"/>
-                <a:ea typeface="Arial"/>
-                <a:cs typeface="Arial"/>
-                <a:sym typeface="Arial"/>
-              </a:defRPr>
-            </a:lvl9pPr>
-          </a:lstStyle>
-          <a:p>
-            <a:pPr marL="571500" indent="-571500">
-              <a:buSzPts val="4400"/>
-              <a:buFont typeface="Arial" panose="020B0604020202020204" pitchFamily="34" charset="0"/>
-              <a:buChar char="•"/>
+          <a:lstStyle/>
+          <a:p>
+            <a:pPr marL="0" marR="0" lvl="0" indent="0" algn="ctr" rtl="0">
+              <a:spcBef>
+                <a:spcPts val="0"/>
+              </a:spcBef>
+              <a:spcAft>
+                <a:spcPts val="0"/>
+              </a:spcAft>
+              <a:buNone/>
             </a:pPr>
             <a:r>
-              <a:rPr lang="en-US" dirty="0"/>
-              <a:t>we are using box plot method to detect outlier. </a:t>
+              <a:rPr lang="en-US" sz="4800" b="1" dirty="0">
+                <a:solidFill>
+                  <a:srgbClr val="FFC000"/>
+                </a:solidFill>
+              </a:rPr>
+              <a:t>Model Building</a:t>
             </a:r>
-            <a:br>
-              <a:rPr lang="en-US" dirty="0"/>
-            </a:br>
-            <a:r>
-              <a:rPr lang="en-US" dirty="0"/>
-              <a:t>Outlier points = Q3 + 1.5 IQR(Upper Quartile) 					     Q1 - 1.5 IQR(Lower Quartile)</a:t>
-            </a:r>
+            <a:endParaRPr dirty="0"/>
           </a:p>
         </p:txBody>
       </p:sp>
     </p:spTree>
     <p:extLst>
       <p:ext uri="{BB962C8B-B14F-4D97-AF65-F5344CB8AC3E}">
-        <p14:creationId xmlns:p14="http://schemas.microsoft.com/office/powerpoint/2010/main" val="4195066268"/>
+        <p14:creationId xmlns:p14="http://schemas.microsoft.com/office/powerpoint/2010/main" val="4214666744"/>
       </p:ext>
     </p:extLst>
   </p:cSld>
@@ -16144,6 +16484,1000 @@
 </file>
 
 <file path=ppt/slides/slide12.xml><?xml version="1.0" encoding="utf-8"?>
+<p:sld xmlns:a="http://schemas.openxmlformats.org/drawingml/2006/main" xmlns:r="http://schemas.openxmlformats.org/officeDocument/2006/relationships" xmlns:p="http://schemas.openxmlformats.org/presentationml/2006/main" showMasterSp="0">
+  <p:cSld>
+    <p:spTree>
+      <p:nvGrpSpPr>
+        <p:cNvPr id="1" name="Shape 188"/>
+        <p:cNvGrpSpPr/>
+        <p:nvPr/>
+      </p:nvGrpSpPr>
+      <p:grpSpPr>
+        <a:xfrm>
+          <a:off x="0" y="0"/>
+          <a:ext cx="0" cy="0"/>
+          <a:chOff x="0" y="0"/>
+          <a:chExt cx="0" cy="0"/>
+        </a:xfrm>
+      </p:grpSpPr>
+      <p:sp>
+        <p:nvSpPr>
+          <p:cNvPr id="189" name="Google Shape;189;p8"/>
+          <p:cNvSpPr txBox="1">
+            <a:spLocks noGrp="1"/>
+          </p:cNvSpPr>
+          <p:nvPr>
+            <p:ph type="body" idx="1"/>
+          </p:nvPr>
+        </p:nvSpPr>
+        <p:spPr>
+          <a:xfrm>
+            <a:off x="5693658" y="1099536"/>
+            <a:ext cx="5526661" cy="5124283"/>
+          </a:xfrm>
+          <a:prstGeom prst="rect">
+            <a:avLst/>
+          </a:prstGeom>
+          <a:noFill/>
+          <a:ln>
+            <a:noFill/>
+          </a:ln>
+        </p:spPr>
+        <p:txBody>
+          <a:bodyPr spcFirstLastPara="1" wrap="square" lIns="91425" tIns="45700" rIns="91425" bIns="45700" anchor="t" anchorCtr="0">
+            <a:normAutofit/>
+          </a:bodyPr>
+          <a:lstStyle/>
+          <a:p>
+            <a:pPr marL="0" marR="0" indent="0" algn="ctr">
+              <a:lnSpc>
+                <a:spcPct val="115000"/>
+              </a:lnSpc>
+              <a:spcBef>
+                <a:spcPts val="0"/>
+              </a:spcBef>
+              <a:spcAft>
+                <a:spcPts val="0"/>
+              </a:spcAft>
+              <a:buNone/>
+            </a:pPr>
+            <a:r>
+              <a:rPr lang="en-US" sz="3200" b="1" dirty="0">
+                <a:effectLst/>
+                <a:latin typeface="Times New Roman" panose="02020603050405020304" pitchFamily="18" charset="0"/>
+                <a:ea typeface="Times New Roman" panose="02020603050405020304" pitchFamily="18" charset="0"/>
+              </a:rPr>
+              <a:t>Random Forest</a:t>
+            </a:r>
+          </a:p>
+          <a:p>
+            <a:pPr indent="-457200">
+              <a:lnSpc>
+                <a:spcPct val="115000"/>
+              </a:lnSpc>
+              <a:spcBef>
+                <a:spcPts val="0"/>
+              </a:spcBef>
+            </a:pPr>
+            <a:r>
+              <a:rPr lang="en-US" sz="2800" dirty="0" err="1">
+                <a:effectLst/>
+                <a:latin typeface="Times New Roman" panose="02020603050405020304" pitchFamily="18" charset="0"/>
+                <a:ea typeface="Times New Roman" panose="02020603050405020304" pitchFamily="18" charset="0"/>
+              </a:rPr>
+              <a:t>RandomForestClassifier</a:t>
+            </a:r>
+            <a:r>
+              <a:rPr lang="en-US" sz="2800" dirty="0">
+                <a:effectLst/>
+                <a:latin typeface="Times New Roman" panose="02020603050405020304" pitchFamily="18" charset="0"/>
+                <a:ea typeface="Times New Roman" panose="02020603050405020304" pitchFamily="18" charset="0"/>
+              </a:rPr>
+              <a:t> class from </a:t>
+            </a:r>
+            <a:r>
+              <a:rPr lang="en-US" sz="2800" dirty="0" err="1">
+                <a:effectLst/>
+                <a:latin typeface="Times New Roman" panose="02020603050405020304" pitchFamily="18" charset="0"/>
+                <a:ea typeface="Times New Roman" panose="02020603050405020304" pitchFamily="18" charset="0"/>
+              </a:rPr>
+              <a:t>sklearn</a:t>
+            </a:r>
+            <a:r>
+              <a:rPr lang="en-US" sz="2800" dirty="0">
+                <a:effectLst/>
+                <a:latin typeface="Times New Roman" panose="02020603050405020304" pitchFamily="18" charset="0"/>
+                <a:ea typeface="Times New Roman" panose="02020603050405020304" pitchFamily="18" charset="0"/>
+              </a:rPr>
+              <a:t> is used to create the model. </a:t>
+            </a:r>
+          </a:p>
+          <a:p>
+            <a:pPr indent="-457200">
+              <a:lnSpc>
+                <a:spcPct val="115000"/>
+              </a:lnSpc>
+              <a:spcBef>
+                <a:spcPts val="0"/>
+              </a:spcBef>
+            </a:pPr>
+            <a:r>
+              <a:rPr lang="en-US" sz="2800" dirty="0">
+                <a:effectLst/>
+                <a:latin typeface="Times New Roman" panose="02020603050405020304" pitchFamily="18" charset="0"/>
+                <a:ea typeface="Times New Roman" panose="02020603050405020304" pitchFamily="18" charset="0"/>
+              </a:rPr>
+              <a:t>Hyperparameter tuning is done over </a:t>
+            </a:r>
+            <a:r>
+              <a:rPr lang="en-US" sz="2800" dirty="0" err="1">
+                <a:effectLst/>
+                <a:latin typeface="Times New Roman" panose="02020603050405020304" pitchFamily="18" charset="0"/>
+                <a:ea typeface="Times New Roman" panose="02020603050405020304" pitchFamily="18" charset="0"/>
+              </a:rPr>
+              <a:t>n_estimators</a:t>
+            </a:r>
+            <a:r>
+              <a:rPr lang="en-US" sz="2800" dirty="0">
+                <a:effectLst/>
+                <a:latin typeface="Times New Roman" panose="02020603050405020304" pitchFamily="18" charset="0"/>
+                <a:ea typeface="Times New Roman" panose="02020603050405020304" pitchFamily="18" charset="0"/>
+              </a:rPr>
+              <a:t> and </a:t>
+            </a:r>
+            <a:r>
+              <a:rPr lang="en-US" sz="2800" dirty="0" err="1">
+                <a:effectLst/>
+                <a:latin typeface="Times New Roman" panose="02020603050405020304" pitchFamily="18" charset="0"/>
+                <a:ea typeface="Times New Roman" panose="02020603050405020304" pitchFamily="18" charset="0"/>
+              </a:rPr>
+              <a:t>max_depth</a:t>
+            </a:r>
+            <a:r>
+              <a:rPr lang="en-US" sz="2800" dirty="0">
+                <a:effectLst/>
+                <a:latin typeface="Times New Roman" panose="02020603050405020304" pitchFamily="18" charset="0"/>
+                <a:ea typeface="Times New Roman" panose="02020603050405020304" pitchFamily="18" charset="0"/>
+              </a:rPr>
+              <a:t> of the ensemble through grid search with five-fold cross-validation.</a:t>
+            </a:r>
+          </a:p>
+        </p:txBody>
+      </p:sp>
+      <p:pic>
+        <p:nvPicPr>
+          <p:cNvPr id="190" name="Google Shape;190;p8"/>
+          <p:cNvPicPr preferRelativeResize="0"/>
+          <p:nvPr/>
+        </p:nvPicPr>
+        <p:blipFill rotWithShape="1">
+          <a:blip r:embed="rId3">
+            <a:alphaModFix/>
+          </a:blip>
+          <a:srcRect b="320"/>
+          <a:stretch/>
+        </p:blipFill>
+        <p:spPr>
+          <a:xfrm rot="10799999">
+            <a:off x="711040" y="1575974"/>
+            <a:ext cx="4105765" cy="4114519"/>
+          </a:xfrm>
+          <a:prstGeom prst="rect">
+            <a:avLst/>
+          </a:prstGeom>
+          <a:noFill/>
+          <a:ln>
+            <a:noFill/>
+          </a:ln>
+        </p:spPr>
+      </p:pic>
+      <p:sp>
+        <p:nvSpPr>
+          <p:cNvPr id="191" name="Google Shape;191;p8"/>
+          <p:cNvSpPr txBox="1"/>
+          <p:nvPr/>
+        </p:nvSpPr>
+        <p:spPr>
+          <a:xfrm>
+            <a:off x="1104642" y="2832450"/>
+            <a:ext cx="3402347" cy="1477328"/>
+          </a:xfrm>
+          <a:prstGeom prst="rect">
+            <a:avLst/>
+          </a:prstGeom>
+          <a:noFill/>
+          <a:ln>
+            <a:noFill/>
+          </a:ln>
+        </p:spPr>
+        <p:txBody>
+          <a:bodyPr spcFirstLastPara="1" wrap="square" lIns="0" tIns="0" rIns="0" bIns="0" anchor="t" anchorCtr="0">
+            <a:spAutoFit/>
+          </a:bodyPr>
+          <a:lstStyle/>
+          <a:p>
+            <a:pPr marL="0" marR="0" lvl="0" indent="0" algn="ctr" rtl="0">
+              <a:spcBef>
+                <a:spcPts val="0"/>
+              </a:spcBef>
+              <a:spcAft>
+                <a:spcPts val="0"/>
+              </a:spcAft>
+              <a:buNone/>
+            </a:pPr>
+            <a:r>
+              <a:rPr lang="en-US" sz="4800" b="1" dirty="0">
+                <a:solidFill>
+                  <a:srgbClr val="FFC000"/>
+                </a:solidFill>
+              </a:rPr>
+              <a:t>Model Building</a:t>
+            </a:r>
+            <a:endParaRPr dirty="0"/>
+          </a:p>
+        </p:txBody>
+      </p:sp>
+    </p:spTree>
+    <p:extLst>
+      <p:ext uri="{BB962C8B-B14F-4D97-AF65-F5344CB8AC3E}">
+        <p14:creationId xmlns:p14="http://schemas.microsoft.com/office/powerpoint/2010/main" val="176676626"/>
+      </p:ext>
+    </p:extLst>
+  </p:cSld>
+  <p:clrMapOvr>
+    <a:masterClrMapping/>
+  </p:clrMapOvr>
+</p:sld>
+</file>
+
+<file path=ppt/slides/slide13.xml><?xml version="1.0" encoding="utf-8"?>
+<p:sld xmlns:a="http://schemas.openxmlformats.org/drawingml/2006/main" xmlns:r="http://schemas.openxmlformats.org/officeDocument/2006/relationships" xmlns:p="http://schemas.openxmlformats.org/presentationml/2006/main" showMasterSp="0">
+  <p:cSld>
+    <p:spTree>
+      <p:nvGrpSpPr>
+        <p:cNvPr id="1" name="Shape 188"/>
+        <p:cNvGrpSpPr/>
+        <p:nvPr/>
+      </p:nvGrpSpPr>
+      <p:grpSpPr>
+        <a:xfrm>
+          <a:off x="0" y="0"/>
+          <a:ext cx="0" cy="0"/>
+          <a:chOff x="0" y="0"/>
+          <a:chExt cx="0" cy="0"/>
+        </a:xfrm>
+      </p:grpSpPr>
+      <p:sp>
+        <p:nvSpPr>
+          <p:cNvPr id="189" name="Google Shape;189;p8"/>
+          <p:cNvSpPr txBox="1">
+            <a:spLocks noGrp="1"/>
+          </p:cNvSpPr>
+          <p:nvPr>
+            <p:ph type="body" idx="1"/>
+          </p:nvPr>
+        </p:nvSpPr>
+        <p:spPr>
+          <a:xfrm>
+            <a:off x="5693658" y="1099536"/>
+            <a:ext cx="5526661" cy="5124283"/>
+          </a:xfrm>
+          <a:prstGeom prst="rect">
+            <a:avLst/>
+          </a:prstGeom>
+          <a:noFill/>
+          <a:ln>
+            <a:noFill/>
+          </a:ln>
+        </p:spPr>
+        <p:txBody>
+          <a:bodyPr spcFirstLastPara="1" wrap="square" lIns="91425" tIns="45700" rIns="91425" bIns="45700" anchor="t" anchorCtr="0">
+            <a:normAutofit/>
+          </a:bodyPr>
+          <a:lstStyle/>
+          <a:p>
+            <a:pPr marL="0" marR="0" indent="0" algn="ctr">
+              <a:lnSpc>
+                <a:spcPct val="115000"/>
+              </a:lnSpc>
+              <a:spcBef>
+                <a:spcPts val="0"/>
+              </a:spcBef>
+              <a:spcAft>
+                <a:spcPts val="0"/>
+              </a:spcAft>
+              <a:buNone/>
+            </a:pPr>
+            <a:r>
+              <a:rPr lang="en-US" sz="3200" b="1" dirty="0">
+                <a:effectLst/>
+                <a:latin typeface="Times New Roman" panose="02020603050405020304" pitchFamily="18" charset="0"/>
+                <a:ea typeface="Times New Roman" panose="02020603050405020304" pitchFamily="18" charset="0"/>
+              </a:rPr>
+              <a:t>Random Forest</a:t>
+            </a:r>
+          </a:p>
+          <a:p>
+            <a:pPr indent="-457200">
+              <a:lnSpc>
+                <a:spcPct val="115000"/>
+              </a:lnSpc>
+              <a:spcBef>
+                <a:spcPts val="0"/>
+              </a:spcBef>
+            </a:pPr>
+            <a:r>
+              <a:rPr lang="en-US" sz="2800" dirty="0" err="1">
+                <a:effectLst/>
+                <a:latin typeface="Times New Roman" panose="02020603050405020304" pitchFamily="18" charset="0"/>
+                <a:ea typeface="Times New Roman" panose="02020603050405020304" pitchFamily="18" charset="0"/>
+              </a:rPr>
+              <a:t>RandomForestClassifier</a:t>
+            </a:r>
+            <a:r>
+              <a:rPr lang="en-US" sz="2800" dirty="0">
+                <a:effectLst/>
+                <a:latin typeface="Times New Roman" panose="02020603050405020304" pitchFamily="18" charset="0"/>
+                <a:ea typeface="Times New Roman" panose="02020603050405020304" pitchFamily="18" charset="0"/>
+              </a:rPr>
+              <a:t> class from </a:t>
+            </a:r>
+            <a:r>
+              <a:rPr lang="en-US" sz="2800" dirty="0" err="1">
+                <a:effectLst/>
+                <a:latin typeface="Times New Roman" panose="02020603050405020304" pitchFamily="18" charset="0"/>
+                <a:ea typeface="Times New Roman" panose="02020603050405020304" pitchFamily="18" charset="0"/>
+              </a:rPr>
+              <a:t>sklearn</a:t>
+            </a:r>
+            <a:r>
+              <a:rPr lang="en-US" sz="2800" dirty="0">
+                <a:effectLst/>
+                <a:latin typeface="Times New Roman" panose="02020603050405020304" pitchFamily="18" charset="0"/>
+                <a:ea typeface="Times New Roman" panose="02020603050405020304" pitchFamily="18" charset="0"/>
+              </a:rPr>
+              <a:t> is used to create the model. </a:t>
+            </a:r>
+          </a:p>
+          <a:p>
+            <a:pPr indent="-457200">
+              <a:lnSpc>
+                <a:spcPct val="115000"/>
+              </a:lnSpc>
+              <a:spcBef>
+                <a:spcPts val="0"/>
+              </a:spcBef>
+            </a:pPr>
+            <a:r>
+              <a:rPr lang="en-US" sz="2800" dirty="0">
+                <a:effectLst/>
+                <a:latin typeface="Times New Roman" panose="02020603050405020304" pitchFamily="18" charset="0"/>
+                <a:ea typeface="Times New Roman" panose="02020603050405020304" pitchFamily="18" charset="0"/>
+              </a:rPr>
+              <a:t>Hyperparameter tuning is done over </a:t>
+            </a:r>
+            <a:r>
+              <a:rPr lang="en-US" sz="2800" dirty="0" err="1">
+                <a:effectLst/>
+                <a:latin typeface="Times New Roman" panose="02020603050405020304" pitchFamily="18" charset="0"/>
+                <a:ea typeface="Times New Roman" panose="02020603050405020304" pitchFamily="18" charset="0"/>
+              </a:rPr>
+              <a:t>n_estimators</a:t>
+            </a:r>
+            <a:r>
+              <a:rPr lang="en-US" sz="2800" dirty="0">
+                <a:effectLst/>
+                <a:latin typeface="Times New Roman" panose="02020603050405020304" pitchFamily="18" charset="0"/>
+                <a:ea typeface="Times New Roman" panose="02020603050405020304" pitchFamily="18" charset="0"/>
+              </a:rPr>
+              <a:t> and </a:t>
+            </a:r>
+            <a:r>
+              <a:rPr lang="en-US" sz="2800" dirty="0" err="1">
+                <a:effectLst/>
+                <a:latin typeface="Times New Roman" panose="02020603050405020304" pitchFamily="18" charset="0"/>
+                <a:ea typeface="Times New Roman" panose="02020603050405020304" pitchFamily="18" charset="0"/>
+              </a:rPr>
+              <a:t>max_depth</a:t>
+            </a:r>
+            <a:r>
+              <a:rPr lang="en-US" sz="2800" dirty="0">
+                <a:effectLst/>
+                <a:latin typeface="Times New Roman" panose="02020603050405020304" pitchFamily="18" charset="0"/>
+                <a:ea typeface="Times New Roman" panose="02020603050405020304" pitchFamily="18" charset="0"/>
+              </a:rPr>
+              <a:t> of the ensemble through grid search with five-fold cross-validation.</a:t>
+            </a:r>
+          </a:p>
+        </p:txBody>
+      </p:sp>
+      <p:pic>
+        <p:nvPicPr>
+          <p:cNvPr id="190" name="Google Shape;190;p8"/>
+          <p:cNvPicPr preferRelativeResize="0"/>
+          <p:nvPr/>
+        </p:nvPicPr>
+        <p:blipFill rotWithShape="1">
+          <a:blip r:embed="rId3">
+            <a:alphaModFix/>
+          </a:blip>
+          <a:srcRect b="320"/>
+          <a:stretch/>
+        </p:blipFill>
+        <p:spPr>
+          <a:xfrm rot="10799999">
+            <a:off x="711040" y="1575974"/>
+            <a:ext cx="4105765" cy="4114519"/>
+          </a:xfrm>
+          <a:prstGeom prst="rect">
+            <a:avLst/>
+          </a:prstGeom>
+          <a:noFill/>
+          <a:ln>
+            <a:noFill/>
+          </a:ln>
+        </p:spPr>
+      </p:pic>
+      <p:sp>
+        <p:nvSpPr>
+          <p:cNvPr id="191" name="Google Shape;191;p8"/>
+          <p:cNvSpPr txBox="1"/>
+          <p:nvPr/>
+        </p:nvSpPr>
+        <p:spPr>
+          <a:xfrm>
+            <a:off x="1104642" y="2832450"/>
+            <a:ext cx="3402347" cy="1477328"/>
+          </a:xfrm>
+          <a:prstGeom prst="rect">
+            <a:avLst/>
+          </a:prstGeom>
+          <a:noFill/>
+          <a:ln>
+            <a:noFill/>
+          </a:ln>
+        </p:spPr>
+        <p:txBody>
+          <a:bodyPr spcFirstLastPara="1" wrap="square" lIns="0" tIns="0" rIns="0" bIns="0" anchor="t" anchorCtr="0">
+            <a:spAutoFit/>
+          </a:bodyPr>
+          <a:lstStyle/>
+          <a:p>
+            <a:pPr marL="0" marR="0" lvl="0" indent="0" algn="ctr" rtl="0">
+              <a:spcBef>
+                <a:spcPts val="0"/>
+              </a:spcBef>
+              <a:spcAft>
+                <a:spcPts val="0"/>
+              </a:spcAft>
+              <a:buNone/>
+            </a:pPr>
+            <a:r>
+              <a:rPr lang="en-US" sz="4800" b="1" dirty="0">
+                <a:solidFill>
+                  <a:srgbClr val="FFC000"/>
+                </a:solidFill>
+              </a:rPr>
+              <a:t>Model Building</a:t>
+            </a:r>
+            <a:endParaRPr dirty="0"/>
+          </a:p>
+        </p:txBody>
+      </p:sp>
+    </p:spTree>
+    <p:extLst>
+      <p:ext uri="{BB962C8B-B14F-4D97-AF65-F5344CB8AC3E}">
+        <p14:creationId xmlns:p14="http://schemas.microsoft.com/office/powerpoint/2010/main" val="1189779979"/>
+      </p:ext>
+    </p:extLst>
+  </p:cSld>
+  <p:clrMapOvr>
+    <a:masterClrMapping/>
+  </p:clrMapOvr>
+</p:sld>
+</file>
+
+<file path=ppt/slides/slide14.xml><?xml version="1.0" encoding="utf-8"?>
+<p:sld xmlns:a="http://schemas.openxmlformats.org/drawingml/2006/main" xmlns:r="http://schemas.openxmlformats.org/officeDocument/2006/relationships" xmlns:p="http://schemas.openxmlformats.org/presentationml/2006/main" showMasterSp="0">
+  <p:cSld>
+    <p:spTree>
+      <p:nvGrpSpPr>
+        <p:cNvPr id="1" name="Shape 188"/>
+        <p:cNvGrpSpPr/>
+        <p:nvPr/>
+      </p:nvGrpSpPr>
+      <p:grpSpPr>
+        <a:xfrm>
+          <a:off x="0" y="0"/>
+          <a:ext cx="0" cy="0"/>
+          <a:chOff x="0" y="0"/>
+          <a:chExt cx="0" cy="0"/>
+        </a:xfrm>
+      </p:grpSpPr>
+      <p:sp>
+        <p:nvSpPr>
+          <p:cNvPr id="189" name="Google Shape;189;p8"/>
+          <p:cNvSpPr txBox="1">
+            <a:spLocks noGrp="1"/>
+          </p:cNvSpPr>
+          <p:nvPr>
+            <p:ph type="body" idx="1"/>
+          </p:nvPr>
+        </p:nvSpPr>
+        <p:spPr>
+          <a:xfrm>
+            <a:off x="4532672" y="1099536"/>
+            <a:ext cx="6687648" cy="3049677"/>
+          </a:xfrm>
+          <a:prstGeom prst="rect">
+            <a:avLst/>
+          </a:prstGeom>
+          <a:noFill/>
+          <a:ln>
+            <a:noFill/>
+          </a:ln>
+        </p:spPr>
+        <p:txBody>
+          <a:bodyPr spcFirstLastPara="1" wrap="square" lIns="91425" tIns="45700" rIns="91425" bIns="45700" anchor="t" anchorCtr="0">
+            <a:normAutofit/>
+          </a:bodyPr>
+          <a:lstStyle/>
+          <a:p>
+            <a:pPr marL="0" marR="0" indent="0" algn="ctr">
+              <a:lnSpc>
+                <a:spcPct val="115000"/>
+              </a:lnSpc>
+              <a:spcBef>
+                <a:spcPts val="0"/>
+              </a:spcBef>
+              <a:spcAft>
+                <a:spcPts val="0"/>
+              </a:spcAft>
+              <a:buNone/>
+            </a:pPr>
+            <a:r>
+              <a:rPr lang="en-US" sz="3200" b="1" dirty="0">
+                <a:effectLst/>
+                <a:latin typeface="Times New Roman" panose="02020603050405020304" pitchFamily="18" charset="0"/>
+                <a:ea typeface="Times New Roman" panose="02020603050405020304" pitchFamily="18" charset="0"/>
+              </a:rPr>
+              <a:t>Random Forest</a:t>
+            </a:r>
+          </a:p>
+          <a:p>
+            <a:pPr indent="-457200">
+              <a:lnSpc>
+                <a:spcPct val="115000"/>
+              </a:lnSpc>
+              <a:spcBef>
+                <a:spcPts val="0"/>
+              </a:spcBef>
+            </a:pPr>
+            <a:endParaRPr lang="en-US" sz="2800" dirty="0">
+              <a:effectLst/>
+              <a:latin typeface="Times New Roman" panose="02020603050405020304" pitchFamily="18" charset="0"/>
+              <a:ea typeface="Times New Roman" panose="02020603050405020304" pitchFamily="18" charset="0"/>
+            </a:endParaRPr>
+          </a:p>
+          <a:p>
+            <a:pPr indent="-457200">
+              <a:lnSpc>
+                <a:spcPct val="115000"/>
+              </a:lnSpc>
+              <a:spcBef>
+                <a:spcPts val="0"/>
+              </a:spcBef>
+            </a:pPr>
+            <a:r>
+              <a:rPr lang="en-US" sz="2800" dirty="0">
+                <a:effectLst/>
+                <a:latin typeface="Times New Roman" panose="02020603050405020304" pitchFamily="18" charset="0"/>
+                <a:ea typeface="Times New Roman" panose="02020603050405020304" pitchFamily="18" charset="0"/>
+              </a:rPr>
+              <a:t>The test accuracy of 90.66% was obtained with a ROC AUC score of 93.8%. </a:t>
+            </a:r>
+          </a:p>
+          <a:p>
+            <a:pPr indent="-457200">
+              <a:lnSpc>
+                <a:spcPct val="115000"/>
+              </a:lnSpc>
+              <a:spcBef>
+                <a:spcPts val="0"/>
+              </a:spcBef>
+            </a:pPr>
+            <a:r>
+              <a:rPr lang="en-US" dirty="0">
+                <a:latin typeface="Times New Roman" panose="02020603050405020304" pitchFamily="18" charset="0"/>
+                <a:ea typeface="Times New Roman" panose="02020603050405020304" pitchFamily="18" charset="0"/>
+              </a:rPr>
+              <a:t>The confusion matrix</a:t>
+            </a:r>
+            <a:endParaRPr lang="en-US" sz="2800" dirty="0">
+              <a:effectLst/>
+              <a:latin typeface="Times New Roman" panose="02020603050405020304" pitchFamily="18" charset="0"/>
+              <a:ea typeface="Times New Roman" panose="02020603050405020304" pitchFamily="18" charset="0"/>
+            </a:endParaRPr>
+          </a:p>
+          <a:p>
+            <a:pPr indent="-457200">
+              <a:lnSpc>
+                <a:spcPct val="115000"/>
+              </a:lnSpc>
+              <a:spcBef>
+                <a:spcPts val="0"/>
+              </a:spcBef>
+            </a:pPr>
+            <a:endParaRPr lang="en-US" sz="2800" dirty="0">
+              <a:effectLst/>
+              <a:latin typeface="Times New Roman" panose="02020603050405020304" pitchFamily="18" charset="0"/>
+              <a:ea typeface="Times New Roman" panose="02020603050405020304" pitchFamily="18" charset="0"/>
+            </a:endParaRPr>
+          </a:p>
+        </p:txBody>
+      </p:sp>
+      <p:pic>
+        <p:nvPicPr>
+          <p:cNvPr id="190" name="Google Shape;190;p8"/>
+          <p:cNvPicPr preferRelativeResize="0"/>
+          <p:nvPr/>
+        </p:nvPicPr>
+        <p:blipFill rotWithShape="1">
+          <a:blip r:embed="rId3">
+            <a:alphaModFix/>
+          </a:blip>
+          <a:srcRect b="320"/>
+          <a:stretch/>
+        </p:blipFill>
+        <p:spPr>
+          <a:xfrm rot="10799999">
+            <a:off x="612718" y="2025445"/>
+            <a:ext cx="3615154" cy="3301254"/>
+          </a:xfrm>
+          <a:prstGeom prst="rect">
+            <a:avLst/>
+          </a:prstGeom>
+          <a:noFill/>
+          <a:ln>
+            <a:noFill/>
+          </a:ln>
+        </p:spPr>
+      </p:pic>
+      <p:sp>
+        <p:nvSpPr>
+          <p:cNvPr id="191" name="Google Shape;191;p8"/>
+          <p:cNvSpPr txBox="1"/>
+          <p:nvPr/>
+        </p:nvSpPr>
+        <p:spPr>
+          <a:xfrm>
+            <a:off x="740848" y="2861947"/>
+            <a:ext cx="3402347" cy="1477328"/>
+          </a:xfrm>
+          <a:prstGeom prst="rect">
+            <a:avLst/>
+          </a:prstGeom>
+          <a:noFill/>
+          <a:ln>
+            <a:noFill/>
+          </a:ln>
+        </p:spPr>
+        <p:txBody>
+          <a:bodyPr spcFirstLastPara="1" wrap="square" lIns="0" tIns="0" rIns="0" bIns="0" anchor="t" anchorCtr="0">
+            <a:spAutoFit/>
+          </a:bodyPr>
+          <a:lstStyle/>
+          <a:p>
+            <a:pPr marL="0" marR="0" lvl="0" indent="0" algn="ctr" rtl="0">
+              <a:spcBef>
+                <a:spcPts val="0"/>
+              </a:spcBef>
+              <a:spcAft>
+                <a:spcPts val="0"/>
+              </a:spcAft>
+              <a:buNone/>
+            </a:pPr>
+            <a:r>
+              <a:rPr lang="en-US" sz="4800" b="1" dirty="0">
+                <a:solidFill>
+                  <a:srgbClr val="FFC000"/>
+                </a:solidFill>
+              </a:rPr>
+              <a:t>Model Results</a:t>
+            </a:r>
+            <a:endParaRPr dirty="0"/>
+          </a:p>
+        </p:txBody>
+      </p:sp>
+      <p:pic>
+        <p:nvPicPr>
+          <p:cNvPr id="4" name="Picture 3">
+            <a:extLst>
+              <a:ext uri="{FF2B5EF4-FFF2-40B4-BE49-F238E27FC236}">
+                <a16:creationId xmlns:a16="http://schemas.microsoft.com/office/drawing/2014/main" id="{90CC3F7E-D065-ACA6-D86E-7CAB76F5E4A5}"/>
+              </a:ext>
+            </a:extLst>
+          </p:cNvPr>
+          <p:cNvPicPr>
+            <a:picLocks noChangeAspect="1"/>
+          </p:cNvPicPr>
+          <p:nvPr/>
+        </p:nvPicPr>
+        <p:blipFill>
+          <a:blip r:embed="rId4"/>
+          <a:stretch>
+            <a:fillRect/>
+          </a:stretch>
+        </p:blipFill>
+        <p:spPr>
+          <a:xfrm>
+            <a:off x="6179571" y="3644447"/>
+            <a:ext cx="3746242" cy="3090650"/>
+          </a:xfrm>
+          <a:prstGeom prst="rect">
+            <a:avLst/>
+          </a:prstGeom>
+        </p:spPr>
+      </p:pic>
+    </p:spTree>
+    <p:extLst>
+      <p:ext uri="{BB962C8B-B14F-4D97-AF65-F5344CB8AC3E}">
+        <p14:creationId xmlns:p14="http://schemas.microsoft.com/office/powerpoint/2010/main" val="3018616472"/>
+      </p:ext>
+    </p:extLst>
+  </p:cSld>
+  <p:clrMapOvr>
+    <a:masterClrMapping/>
+  </p:clrMapOvr>
+</p:sld>
+</file>
+
+<file path=ppt/slides/slide15.xml><?xml version="1.0" encoding="utf-8"?>
+<p:sld xmlns:a="http://schemas.openxmlformats.org/drawingml/2006/main" xmlns:r="http://schemas.openxmlformats.org/officeDocument/2006/relationships" xmlns:p="http://schemas.openxmlformats.org/presentationml/2006/main" showMasterSp="0">
+  <p:cSld>
+    <p:spTree>
+      <p:nvGrpSpPr>
+        <p:cNvPr id="1" name="Shape 188"/>
+        <p:cNvGrpSpPr/>
+        <p:nvPr/>
+      </p:nvGrpSpPr>
+      <p:grpSpPr>
+        <a:xfrm>
+          <a:off x="0" y="0"/>
+          <a:ext cx="0" cy="0"/>
+          <a:chOff x="0" y="0"/>
+          <a:chExt cx="0" cy="0"/>
+        </a:xfrm>
+      </p:grpSpPr>
+      <p:sp>
+        <p:nvSpPr>
+          <p:cNvPr id="189" name="Google Shape;189;p8"/>
+          <p:cNvSpPr txBox="1">
+            <a:spLocks noGrp="1"/>
+          </p:cNvSpPr>
+          <p:nvPr>
+            <p:ph type="body" idx="1"/>
+          </p:nvPr>
+        </p:nvSpPr>
+        <p:spPr>
+          <a:xfrm>
+            <a:off x="4532672" y="1002890"/>
+            <a:ext cx="6687648" cy="2448234"/>
+          </a:xfrm>
+          <a:prstGeom prst="rect">
+            <a:avLst/>
+          </a:prstGeom>
+          <a:noFill/>
+          <a:ln>
+            <a:noFill/>
+          </a:ln>
+        </p:spPr>
+        <p:txBody>
+          <a:bodyPr spcFirstLastPara="1" wrap="square" lIns="91425" tIns="45700" rIns="91425" bIns="45700" anchor="t" anchorCtr="0">
+            <a:normAutofit/>
+          </a:bodyPr>
+          <a:lstStyle/>
+          <a:p>
+            <a:pPr marL="0" marR="0" indent="0" algn="ctr">
+              <a:lnSpc>
+                <a:spcPct val="115000"/>
+              </a:lnSpc>
+              <a:spcBef>
+                <a:spcPts val="0"/>
+              </a:spcBef>
+              <a:spcAft>
+                <a:spcPts val="0"/>
+              </a:spcAft>
+              <a:buNone/>
+            </a:pPr>
+            <a:r>
+              <a:rPr lang="en-US" sz="3200" b="1" dirty="0">
+                <a:effectLst/>
+                <a:latin typeface="Times New Roman" panose="02020603050405020304" pitchFamily="18" charset="0"/>
+                <a:ea typeface="Times New Roman" panose="02020603050405020304" pitchFamily="18" charset="0"/>
+              </a:rPr>
+              <a:t>Random Forest</a:t>
+            </a:r>
+            <a:endParaRPr lang="en-US" sz="2800" dirty="0">
+              <a:effectLst/>
+              <a:latin typeface="Times New Roman" panose="02020603050405020304" pitchFamily="18" charset="0"/>
+              <a:ea typeface="Times New Roman" panose="02020603050405020304" pitchFamily="18" charset="0"/>
+            </a:endParaRPr>
+          </a:p>
+          <a:p>
+            <a:pPr indent="-457200">
+              <a:lnSpc>
+                <a:spcPct val="115000"/>
+              </a:lnSpc>
+              <a:spcBef>
+                <a:spcPts val="0"/>
+              </a:spcBef>
+            </a:pPr>
+            <a:r>
+              <a:rPr lang="en-US" sz="2800" dirty="0">
+                <a:effectLst/>
+                <a:latin typeface="Times New Roman" panose="02020603050405020304" pitchFamily="18" charset="0"/>
+                <a:ea typeface="Times New Roman" panose="02020603050405020304" pitchFamily="18" charset="0"/>
+              </a:rPr>
+              <a:t>The test accuracy of 90.66% was obtained with a ROC AUC score of 93.8%. </a:t>
+            </a:r>
+          </a:p>
+          <a:p>
+            <a:pPr indent="-457200">
+              <a:lnSpc>
+                <a:spcPct val="115000"/>
+              </a:lnSpc>
+              <a:spcBef>
+                <a:spcPts val="0"/>
+              </a:spcBef>
+            </a:pPr>
+            <a:r>
+              <a:rPr lang="en-US" dirty="0">
+                <a:latin typeface="Times New Roman" panose="02020603050405020304" pitchFamily="18" charset="0"/>
+                <a:ea typeface="Times New Roman" panose="02020603050405020304" pitchFamily="18" charset="0"/>
+              </a:rPr>
+              <a:t>The ROC AUC Curve</a:t>
+            </a:r>
+            <a:endParaRPr lang="en-US" sz="2800" dirty="0">
+              <a:effectLst/>
+              <a:latin typeface="Times New Roman" panose="02020603050405020304" pitchFamily="18" charset="0"/>
+              <a:ea typeface="Times New Roman" panose="02020603050405020304" pitchFamily="18" charset="0"/>
+            </a:endParaRPr>
+          </a:p>
+          <a:p>
+            <a:pPr indent="-457200">
+              <a:lnSpc>
+                <a:spcPct val="115000"/>
+              </a:lnSpc>
+              <a:spcBef>
+                <a:spcPts val="0"/>
+              </a:spcBef>
+            </a:pPr>
+            <a:endParaRPr lang="en-US" sz="2800" dirty="0">
+              <a:effectLst/>
+              <a:latin typeface="Times New Roman" panose="02020603050405020304" pitchFamily="18" charset="0"/>
+              <a:ea typeface="Times New Roman" panose="02020603050405020304" pitchFamily="18" charset="0"/>
+            </a:endParaRPr>
+          </a:p>
+        </p:txBody>
+      </p:sp>
+      <p:pic>
+        <p:nvPicPr>
+          <p:cNvPr id="190" name="Google Shape;190;p8"/>
+          <p:cNvPicPr preferRelativeResize="0"/>
+          <p:nvPr/>
+        </p:nvPicPr>
+        <p:blipFill rotWithShape="1">
+          <a:blip r:embed="rId3">
+            <a:alphaModFix/>
+          </a:blip>
+          <a:srcRect b="320"/>
+          <a:stretch/>
+        </p:blipFill>
+        <p:spPr>
+          <a:xfrm rot="10799999">
+            <a:off x="612718" y="2025445"/>
+            <a:ext cx="3615154" cy="3301254"/>
+          </a:xfrm>
+          <a:prstGeom prst="rect">
+            <a:avLst/>
+          </a:prstGeom>
+          <a:noFill/>
+          <a:ln>
+            <a:noFill/>
+          </a:ln>
+        </p:spPr>
+      </p:pic>
+      <p:sp>
+        <p:nvSpPr>
+          <p:cNvPr id="191" name="Google Shape;191;p8"/>
+          <p:cNvSpPr txBox="1"/>
+          <p:nvPr/>
+        </p:nvSpPr>
+        <p:spPr>
+          <a:xfrm>
+            <a:off x="740848" y="2861947"/>
+            <a:ext cx="3402347" cy="1477328"/>
+          </a:xfrm>
+          <a:prstGeom prst="rect">
+            <a:avLst/>
+          </a:prstGeom>
+          <a:noFill/>
+          <a:ln>
+            <a:noFill/>
+          </a:ln>
+        </p:spPr>
+        <p:txBody>
+          <a:bodyPr spcFirstLastPara="1" wrap="square" lIns="0" tIns="0" rIns="0" bIns="0" anchor="t" anchorCtr="0">
+            <a:spAutoFit/>
+          </a:bodyPr>
+          <a:lstStyle/>
+          <a:p>
+            <a:pPr marL="0" marR="0" lvl="0" indent="0" algn="ctr" rtl="0">
+              <a:spcBef>
+                <a:spcPts val="0"/>
+              </a:spcBef>
+              <a:spcAft>
+                <a:spcPts val="0"/>
+              </a:spcAft>
+              <a:buNone/>
+            </a:pPr>
+            <a:r>
+              <a:rPr lang="en-US" sz="4800" b="1" dirty="0">
+                <a:solidFill>
+                  <a:srgbClr val="FFC000"/>
+                </a:solidFill>
+              </a:rPr>
+              <a:t>Model Results</a:t>
+            </a:r>
+            <a:endParaRPr dirty="0"/>
+          </a:p>
+        </p:txBody>
+      </p:sp>
+      <p:pic>
+        <p:nvPicPr>
+          <p:cNvPr id="2" name="Picture 1">
+            <a:extLst>
+              <a:ext uri="{FF2B5EF4-FFF2-40B4-BE49-F238E27FC236}">
+                <a16:creationId xmlns:a16="http://schemas.microsoft.com/office/drawing/2014/main" id="{8836C0AD-DD6E-170A-64F0-6FBF3B8C290C}"/>
+              </a:ext>
+            </a:extLst>
+          </p:cNvPr>
+          <p:cNvPicPr>
+            <a:picLocks noChangeAspect="1"/>
+          </p:cNvPicPr>
+          <p:nvPr/>
+        </p:nvPicPr>
+        <p:blipFill>
+          <a:blip r:embed="rId4"/>
+          <a:stretch>
+            <a:fillRect/>
+          </a:stretch>
+        </p:blipFill>
+        <p:spPr>
+          <a:xfrm>
+            <a:off x="5119903" y="3222890"/>
+            <a:ext cx="4617827" cy="3207405"/>
+          </a:xfrm>
+          <a:prstGeom prst="rect">
+            <a:avLst/>
+          </a:prstGeom>
+        </p:spPr>
+      </p:pic>
+    </p:spTree>
+    <p:extLst>
+      <p:ext uri="{BB962C8B-B14F-4D97-AF65-F5344CB8AC3E}">
+        <p14:creationId xmlns:p14="http://schemas.microsoft.com/office/powerpoint/2010/main" val="1410478566"/>
+      </p:ext>
+    </p:extLst>
+  </p:cSld>
+  <p:clrMapOvr>
+    <a:masterClrMapping/>
+  </p:clrMapOvr>
+</p:sld>
+</file>
+
+<file path=ppt/slides/slide16.xml><?xml version="1.0" encoding="utf-8"?>
 <p:sld xmlns:a="http://schemas.openxmlformats.org/drawingml/2006/main" xmlns:r="http://schemas.openxmlformats.org/officeDocument/2006/relationships" xmlns:p="http://schemas.openxmlformats.org/presentationml/2006/main">
   <p:cSld>
     <p:spTree>
@@ -16175,7 +17509,7 @@
         </p:blipFill>
         <p:spPr>
           <a:xfrm>
-            <a:off x="685800" y="4498956"/>
+            <a:off x="1403555" y="4498956"/>
             <a:ext cx="1981479" cy="587839"/>
           </a:xfrm>
           <a:prstGeom prst="rect">
@@ -16459,7 +17793,7 @@
         </p:blipFill>
         <p:spPr>
           <a:xfrm>
-            <a:off x="3619754" y="4498956"/>
+            <a:off x="5143754" y="4489124"/>
             <a:ext cx="1981479" cy="587839"/>
           </a:xfrm>
           <a:prstGeom prst="rect">
@@ -16486,7 +17820,7 @@
         </p:blipFill>
         <p:spPr>
           <a:xfrm>
-            <a:off x="6647401" y="4498956"/>
+            <a:off x="8948149" y="4528453"/>
             <a:ext cx="1981479" cy="587839"/>
           </a:xfrm>
           <a:prstGeom prst="rect">
@@ -16506,8 +17840,8 @@
         </p:nvSpPr>
         <p:spPr>
           <a:xfrm>
-            <a:off x="478557" y="3451651"/>
-            <a:ext cx="2421815" cy="265714"/>
+            <a:off x="1196312" y="3451651"/>
+            <a:ext cx="2421815" cy="344710"/>
           </a:xfrm>
           <a:prstGeom prst="rect">
             <a:avLst/>
@@ -16536,7 +17870,7 @@
               <a:buNone/>
             </a:pPr>
             <a:r>
-              <a:rPr lang="en-US" sz="1600">
+              <a:rPr lang="en-US" sz="1600" dirty="0">
                 <a:solidFill>
                   <a:schemeClr val="lt1"/>
                 </a:solidFill>
@@ -16545,9 +17879,9 @@
                 <a:cs typeface="Calibri"/>
                 <a:sym typeface="Calibri"/>
               </a:rPr>
-              <a:t>Month with most subscribers</a:t>
+              <a:t>Best Test Accuracy</a:t>
             </a:r>
-            <a:endParaRPr/>
+            <a:endParaRPr dirty="0"/>
           </a:p>
         </p:txBody>
       </p:sp>
@@ -16559,8 +17893,8 @@
         </p:nvSpPr>
         <p:spPr>
           <a:xfrm>
-            <a:off x="478557" y="2073108"/>
-            <a:ext cx="2421815" cy="1034129"/>
+            <a:off x="891513" y="2279586"/>
+            <a:ext cx="3031559" cy="775597"/>
           </a:xfrm>
           <a:prstGeom prst="rect">
             <a:avLst/>
@@ -16589,7 +17923,7 @@
               <a:buNone/>
             </a:pPr>
             <a:r>
-              <a:rPr lang="en-US" sz="4800" dirty="0">
+              <a:rPr lang="en-US" sz="3600" dirty="0">
                 <a:solidFill>
                   <a:srgbClr val="A100FF"/>
                 </a:solidFill>
@@ -16598,9 +17932,9 @@
                 <a:cs typeface="Calibri"/>
                 <a:sym typeface="Calibri"/>
               </a:rPr>
-              <a:t>May</a:t>
+              <a:t>Random Forest</a:t>
             </a:r>
-            <a:endParaRPr dirty="0"/>
+            <a:endParaRPr sz="1050" dirty="0"/>
           </a:p>
         </p:txBody>
       </p:sp>
@@ -16612,8 +17946,8 @@
         </p:nvSpPr>
         <p:spPr>
           <a:xfrm>
-            <a:off x="3255628" y="3451651"/>
-            <a:ext cx="2589340" cy="547842"/>
+            <a:off x="4779628" y="3441819"/>
+            <a:ext cx="2589340" cy="344710"/>
           </a:xfrm>
           <a:prstGeom prst="rect">
             <a:avLst/>
@@ -16642,7 +17976,7 @@
               <a:buNone/>
             </a:pPr>
             <a:r>
-              <a:rPr lang="en-US" sz="1600">
+              <a:rPr lang="en-US" sz="1600" dirty="0">
                 <a:solidFill>
                   <a:schemeClr val="lt1"/>
                 </a:solidFill>
@@ -16651,9 +17985,9 @@
                 <a:cs typeface="Calibri"/>
                 <a:sym typeface="Calibri"/>
               </a:rPr>
-              <a:t>Age Group with most transactions</a:t>
+              <a:t>Best ROC AUC Score</a:t>
             </a:r>
-            <a:endParaRPr/>
+            <a:endParaRPr dirty="0"/>
           </a:p>
         </p:txBody>
       </p:sp>
@@ -16665,8 +17999,8 @@
         </p:nvSpPr>
         <p:spPr>
           <a:xfrm>
-            <a:off x="2900372" y="2073108"/>
-            <a:ext cx="3112854" cy="806888"/>
+            <a:off x="4689843" y="2279585"/>
+            <a:ext cx="3112854" cy="775597"/>
           </a:xfrm>
           <a:prstGeom prst="rect">
             <a:avLst/>
@@ -16695,7 +18029,7 @@
               <a:buNone/>
             </a:pPr>
             <a:r>
-              <a:rPr lang="en-US" sz="4800">
+              <a:rPr lang="en-US" sz="3600" dirty="0">
                 <a:solidFill>
                   <a:srgbClr val="A100FF"/>
                 </a:solidFill>
@@ -16704,49 +18038,22 @@
                 <a:cs typeface="Calibri"/>
                 <a:sym typeface="Calibri"/>
               </a:rPr>
-              <a:t>26-39</a:t>
+              <a:t>Random Forest</a:t>
             </a:r>
-            <a:endParaRPr/>
+            <a:endParaRPr sz="1050" dirty="0"/>
           </a:p>
         </p:txBody>
       </p:sp>
-      <p:pic>
-        <p:nvPicPr>
-          <p:cNvPr id="302" name="Google Shape;302;p21"/>
-          <p:cNvPicPr preferRelativeResize="0"/>
-          <p:nvPr/>
-        </p:nvPicPr>
-        <p:blipFill rotWithShape="1">
-          <a:blip r:embed="rId3">
-            <a:alphaModFix/>
-          </a:blip>
-          <a:srcRect/>
-          <a:stretch/>
-        </p:blipFill>
-        <p:spPr>
-          <a:xfrm>
-            <a:off x="9650499" y="4485536"/>
-            <a:ext cx="1981479" cy="587839"/>
-          </a:xfrm>
-          <a:prstGeom prst="rect">
-            <a:avLst/>
-          </a:prstGeom>
-          <a:noFill/>
-          <a:ln>
-            <a:noFill/>
-          </a:ln>
-        </p:spPr>
-      </p:pic>
       <p:sp>
         <p:nvSpPr>
-          <p:cNvPr id="303" name="Google Shape;303;p21"/>
+          <p:cNvPr id="305" name="Google Shape;305;p21"/>
           <p:cNvSpPr txBox="1"/>
           <p:nvPr/>
         </p:nvSpPr>
         <p:spPr>
           <a:xfrm>
-            <a:off x="9488271" y="3385941"/>
-            <a:ext cx="2255700" cy="265714"/>
+            <a:off x="8828565" y="3415438"/>
+            <a:ext cx="2255700" cy="689420"/>
           </a:xfrm>
           <a:prstGeom prst="rect">
             <a:avLst/>
@@ -16775,7 +18082,7 @@
               <a:buNone/>
             </a:pPr>
             <a:r>
-              <a:rPr lang="en-US" sz="1600">
+              <a:rPr lang="en-US" sz="1600" dirty="0">
                 <a:solidFill>
                   <a:schemeClr val="lt1"/>
                 </a:solidFill>
@@ -16784,115 +18091,9 @@
                 <a:cs typeface="Calibri"/>
                 <a:sym typeface="Calibri"/>
               </a:rPr>
-              <a:t>Best Mode of Contact</a:t>
+              <a:t>Most influential variable after duration </a:t>
             </a:r>
-            <a:endParaRPr/>
-          </a:p>
-        </p:txBody>
-      </p:sp>
-      <p:sp>
-        <p:nvSpPr>
-          <p:cNvPr id="304" name="Google Shape;304;p21"/>
-          <p:cNvSpPr txBox="1"/>
-          <p:nvPr/>
-        </p:nvSpPr>
-        <p:spPr>
-          <a:xfrm>
-            <a:off x="9079146" y="2086949"/>
-            <a:ext cx="3112854" cy="827214"/>
-          </a:xfrm>
-          <a:prstGeom prst="rect">
-            <a:avLst/>
-          </a:prstGeom>
-          <a:noFill/>
-          <a:ln>
-            <a:noFill/>
-          </a:ln>
-        </p:spPr>
-        <p:txBody>
-          <a:bodyPr spcFirstLastPara="1" wrap="square" lIns="0" tIns="0" rIns="0" bIns="0" anchor="t" anchorCtr="0">
-            <a:spAutoFit/>
-          </a:bodyPr>
-          <a:lstStyle/>
-          <a:p>
-            <a:pPr marL="0" marR="0" lvl="0" indent="0" algn="ctr" rtl="0">
-              <a:lnSpc>
-                <a:spcPct val="124444"/>
-              </a:lnSpc>
-              <a:spcBef>
-                <a:spcPts val="0"/>
-              </a:spcBef>
-              <a:spcAft>
-                <a:spcPts val="0"/>
-              </a:spcAft>
-              <a:buNone/>
-            </a:pPr>
-            <a:r>
-              <a:rPr lang="en-US" sz="5400">
-                <a:solidFill>
-                  <a:srgbClr val="A100FF"/>
-                </a:solidFill>
-                <a:latin typeface="Calibri"/>
-                <a:ea typeface="Calibri"/>
-                <a:cs typeface="Calibri"/>
-                <a:sym typeface="Calibri"/>
-              </a:rPr>
-              <a:t>Cellular</a:t>
-            </a:r>
-            <a:endParaRPr/>
-          </a:p>
-        </p:txBody>
-      </p:sp>
-      <p:sp>
-        <p:nvSpPr>
-          <p:cNvPr id="305" name="Google Shape;305;p21"/>
-          <p:cNvSpPr txBox="1"/>
-          <p:nvPr/>
-        </p:nvSpPr>
-        <p:spPr>
-          <a:xfrm>
-            <a:off x="6527817" y="3385941"/>
-            <a:ext cx="2255700" cy="547842"/>
-          </a:xfrm>
-          <a:prstGeom prst="rect">
-            <a:avLst/>
-          </a:prstGeom>
-          <a:noFill/>
-          <a:ln>
-            <a:noFill/>
-          </a:ln>
-        </p:spPr>
-        <p:txBody>
-          <a:bodyPr spcFirstLastPara="1" wrap="square" lIns="0" tIns="0" rIns="0" bIns="0" anchor="t" anchorCtr="0">
-            <a:spAutoFit/>
-          </a:bodyPr>
-          <a:lstStyle/>
-          <a:p>
-            <a:pPr marL="0" marR="0" lvl="0" indent="0" algn="ctr" rtl="0">
-              <a:lnSpc>
-                <a:spcPct val="139937"/>
-              </a:lnSpc>
-              <a:spcBef>
-                <a:spcPts val="0"/>
-              </a:spcBef>
-              <a:spcAft>
-                <a:spcPts val="0"/>
-              </a:spcAft>
-              <a:buNone/>
-            </a:pPr>
-            <a:r>
-              <a:rPr lang="en-US" sz="1600">
-                <a:solidFill>
-                  <a:schemeClr val="lt1"/>
-                </a:solidFill>
-                <a:latin typeface="Calibri"/>
-                <a:ea typeface="Calibri"/>
-                <a:cs typeface="Calibri"/>
-                <a:sym typeface="Calibri"/>
-              </a:rPr>
-              <a:t>Day of the week with most subscribers </a:t>
-            </a:r>
-            <a:endParaRPr/>
+            <a:endParaRPr dirty="0"/>
           </a:p>
         </p:txBody>
       </p:sp>
@@ -16904,7 +18105,7 @@
         </p:nvSpPr>
         <p:spPr>
           <a:xfrm>
-            <a:off x="6082157" y="2132389"/>
+            <a:off x="8402570" y="2319203"/>
             <a:ext cx="3112854" cy="738664"/>
           </a:xfrm>
           <a:prstGeom prst="rect">
@@ -16931,7 +18132,7 @@
               <a:buNone/>
             </a:pPr>
             <a:r>
-              <a:rPr lang="en-US" sz="4800">
+              <a:rPr lang="en-US" sz="4800" dirty="0">
                 <a:solidFill>
                   <a:srgbClr val="A100FF"/>
                 </a:solidFill>
@@ -16940,9 +18141,9 @@
                 <a:cs typeface="Calibri"/>
                 <a:sym typeface="Calibri"/>
               </a:rPr>
-              <a:t>Thursday</a:t>
+              <a:t>euribor3m</a:t>
             </a:r>
-            <a:endParaRPr/>
+            <a:endParaRPr dirty="0"/>
           </a:p>
         </p:txBody>
       </p:sp>
@@ -16954,12 +18155,12 @@
 </p:sld>
 </file>
 
-<file path=ppt/slides/slide13.xml><?xml version="1.0" encoding="utf-8"?>
-<p:sld xmlns:a="http://schemas.openxmlformats.org/drawingml/2006/main" xmlns:r="http://schemas.openxmlformats.org/officeDocument/2006/relationships" xmlns:p="http://schemas.openxmlformats.org/presentationml/2006/main">
+<file path=ppt/slides/slide17.xml><?xml version="1.0" encoding="utf-8"?>
+<p:sld xmlns:a="http://schemas.openxmlformats.org/drawingml/2006/main" xmlns:r="http://schemas.openxmlformats.org/officeDocument/2006/relationships" xmlns:p="http://schemas.openxmlformats.org/presentationml/2006/main" showMasterSp="0">
   <p:cSld>
     <p:spTree>
       <p:nvGrpSpPr>
-        <p:cNvPr id="1" name="Shape 340"/>
+        <p:cNvPr id="1" name="Shape 188"/>
         <p:cNvGrpSpPr/>
         <p:nvPr/>
       </p:nvGrpSpPr>
@@ -16971,9 +18172,176 @@
           <a:chExt cx="0" cy="0"/>
         </a:xfrm>
       </p:grpSpPr>
+      <p:sp>
+        <p:nvSpPr>
+          <p:cNvPr id="189" name="Google Shape;189;p8"/>
+          <p:cNvSpPr txBox="1">
+            <a:spLocks noGrp="1"/>
+          </p:cNvSpPr>
+          <p:nvPr>
+            <p:ph type="body" idx="1"/>
+          </p:nvPr>
+        </p:nvSpPr>
+        <p:spPr>
+          <a:xfrm>
+            <a:off x="5693658" y="1099536"/>
+            <a:ext cx="5526661" cy="5124283"/>
+          </a:xfrm>
+          <a:prstGeom prst="rect">
+            <a:avLst/>
+          </a:prstGeom>
+          <a:noFill/>
+          <a:ln>
+            <a:noFill/>
+          </a:ln>
+        </p:spPr>
+        <p:txBody>
+          <a:bodyPr spcFirstLastPara="1" wrap="square" lIns="91425" tIns="45700" rIns="91425" bIns="45700" anchor="t" anchorCtr="0">
+            <a:normAutofit/>
+          </a:bodyPr>
+          <a:lstStyle/>
+          <a:p>
+            <a:pPr marL="0" indent="0">
+              <a:lnSpc>
+                <a:spcPct val="115000"/>
+              </a:lnSpc>
+              <a:spcBef>
+                <a:spcPts val="0"/>
+              </a:spcBef>
+              <a:buNone/>
+            </a:pPr>
+            <a:r>
+              <a:rPr lang="en-US" sz="2800" dirty="0">
+                <a:effectLst/>
+                <a:latin typeface="Times New Roman" panose="02020603050405020304" pitchFamily="18" charset="0"/>
+                <a:ea typeface="Times New Roman" panose="02020603050405020304" pitchFamily="18" charset="0"/>
+              </a:rPr>
+              <a:t>ABC bank should:</a:t>
+            </a:r>
+          </a:p>
+          <a:p>
+            <a:pPr indent="-457200">
+              <a:lnSpc>
+                <a:spcPct val="115000"/>
+              </a:lnSpc>
+              <a:spcBef>
+                <a:spcPts val="0"/>
+              </a:spcBef>
+            </a:pPr>
+            <a:r>
+              <a:rPr lang="en-US" dirty="0">
+                <a:latin typeface="Times New Roman" panose="02020603050405020304" pitchFamily="18" charset="0"/>
+                <a:ea typeface="Times New Roman" panose="02020603050405020304" pitchFamily="18" charset="0"/>
+              </a:rPr>
+              <a:t>H</a:t>
+            </a:r>
+            <a:r>
+              <a:rPr lang="en-US" sz="2800" dirty="0">
+                <a:effectLst/>
+                <a:latin typeface="Times New Roman" panose="02020603050405020304" pitchFamily="18" charset="0"/>
+                <a:ea typeface="Times New Roman" panose="02020603050405020304" pitchFamily="18" charset="0"/>
+              </a:rPr>
+              <a:t>ire more people to work for them </a:t>
+            </a:r>
+          </a:p>
+          <a:p>
+            <a:pPr indent="-457200">
+              <a:lnSpc>
+                <a:spcPct val="115000"/>
+              </a:lnSpc>
+              <a:spcBef>
+                <a:spcPts val="0"/>
+              </a:spcBef>
+            </a:pPr>
+            <a:r>
+              <a:rPr lang="en-US" dirty="0">
+                <a:latin typeface="Times New Roman" panose="02020603050405020304" pitchFamily="18" charset="0"/>
+                <a:ea typeface="Times New Roman" panose="02020603050405020304" pitchFamily="18" charset="0"/>
+              </a:rPr>
+              <a:t>I</a:t>
+            </a:r>
+            <a:r>
+              <a:rPr lang="en-US" sz="2800" dirty="0">
+                <a:effectLst/>
+                <a:latin typeface="Times New Roman" panose="02020603050405020304" pitchFamily="18" charset="0"/>
+                <a:ea typeface="Times New Roman" panose="02020603050405020304" pitchFamily="18" charset="0"/>
+              </a:rPr>
+              <a:t>mprove the quality of conversation on the phone</a:t>
+            </a:r>
+          </a:p>
+          <a:p>
+            <a:pPr indent="-457200">
+              <a:lnSpc>
+                <a:spcPct val="115000"/>
+              </a:lnSpc>
+              <a:spcBef>
+                <a:spcPts val="0"/>
+              </a:spcBef>
+            </a:pPr>
+            <a:r>
+              <a:rPr lang="en-US" dirty="0">
+                <a:latin typeface="Times New Roman" panose="02020603050405020304" pitchFamily="18" charset="0"/>
+                <a:ea typeface="Times New Roman" panose="02020603050405020304" pitchFamily="18" charset="0"/>
+              </a:rPr>
+              <a:t>R</a:t>
+            </a:r>
+            <a:r>
+              <a:rPr lang="en-US" sz="2800" dirty="0">
+                <a:effectLst/>
+                <a:latin typeface="Times New Roman" panose="02020603050405020304" pitchFamily="18" charset="0"/>
+                <a:ea typeface="Times New Roman" panose="02020603050405020304" pitchFamily="18" charset="0"/>
+              </a:rPr>
+              <a:t>un their campaigns when interest rates are high and macroeconomic environment is stable.</a:t>
+            </a:r>
+          </a:p>
+          <a:p>
+            <a:pPr indent="-457200">
+              <a:lnSpc>
+                <a:spcPct val="115000"/>
+              </a:lnSpc>
+              <a:spcBef>
+                <a:spcPts val="0"/>
+              </a:spcBef>
+            </a:pPr>
+            <a:r>
+              <a:rPr lang="en-US" dirty="0">
+                <a:latin typeface="Times New Roman" panose="02020603050405020304" pitchFamily="18" charset="0"/>
+                <a:ea typeface="Times New Roman" panose="02020603050405020304" pitchFamily="18" charset="0"/>
+              </a:rPr>
+              <a:t>Target old age groups</a:t>
+            </a:r>
+            <a:endParaRPr lang="en-US" sz="2800" dirty="0">
+              <a:effectLst/>
+              <a:latin typeface="Times New Roman" panose="02020603050405020304" pitchFamily="18" charset="0"/>
+              <a:ea typeface="Times New Roman" panose="02020603050405020304" pitchFamily="18" charset="0"/>
+            </a:endParaRPr>
+          </a:p>
+          <a:p>
+            <a:pPr indent="-457200">
+              <a:lnSpc>
+                <a:spcPct val="115000"/>
+              </a:lnSpc>
+              <a:spcBef>
+                <a:spcPts val="0"/>
+              </a:spcBef>
+            </a:pPr>
+            <a:endParaRPr lang="en-US" sz="2800" dirty="0">
+              <a:effectLst/>
+              <a:latin typeface="Times New Roman" panose="02020603050405020304" pitchFamily="18" charset="0"/>
+              <a:ea typeface="Times New Roman" panose="02020603050405020304" pitchFamily="18" charset="0"/>
+            </a:endParaRPr>
+          </a:p>
+        </p:txBody>
+      </p:sp>
       <p:pic>
         <p:nvPicPr>
-          <p:cNvPr id="341" name="Google Shape;341;p23"/>
+          <p:cNvPr id="2" name="Google Shape;341;p23">
+            <a:extLst>
+              <a:ext uri="{FF2B5EF4-FFF2-40B4-BE49-F238E27FC236}">
+                <a16:creationId xmlns:a16="http://schemas.microsoft.com/office/drawing/2014/main" id="{8112E417-A32C-D450-06B5-E26E85AD4CFE}"/>
+              </a:ext>
+            </a:extLst>
+          </p:cNvPr>
           <p:cNvPicPr preferRelativeResize="0"/>
           <p:nvPr/>
         </p:nvPicPr>
@@ -16986,7 +18354,7 @@
         </p:blipFill>
         <p:spPr>
           <a:xfrm rot="10799999">
-            <a:off x="295909" y="1491713"/>
+            <a:off x="482722" y="1580203"/>
             <a:ext cx="4135122" cy="4143939"/>
           </a:xfrm>
           <a:prstGeom prst="rect">
@@ -17000,13 +18368,19 @@
       </p:pic>
       <p:sp>
         <p:nvSpPr>
-          <p:cNvPr id="342" name="Google Shape;342;p23"/>
+          <p:cNvPr id="3" name="Google Shape;342;p23">
+            <a:extLst>
+              <a:ext uri="{FF2B5EF4-FFF2-40B4-BE49-F238E27FC236}">
+                <a16:creationId xmlns:a16="http://schemas.microsoft.com/office/drawing/2014/main" id="{EAE5D94E-68F5-2883-EA7E-C30C75772A2E}"/>
+              </a:ext>
+            </a:extLst>
+          </p:cNvPr>
           <p:cNvSpPr txBox="1"/>
           <p:nvPr/>
         </p:nvSpPr>
         <p:spPr>
           <a:xfrm>
-            <a:off x="-312253" y="3180432"/>
+            <a:off x="-125440" y="3268922"/>
             <a:ext cx="5347240" cy="1231106"/>
           </a:xfrm>
           <a:prstGeom prst="rect">
@@ -17033,7 +18407,7 @@
               <a:buNone/>
             </a:pPr>
             <a:r>
-              <a:rPr lang="en-US" sz="4000">
+              <a:rPr lang="en-US" sz="4000" dirty="0">
                 <a:solidFill>
                   <a:schemeClr val="lt1"/>
                 </a:solidFill>
@@ -17044,7 +18418,7 @@
               </a:rPr>
               <a:t>Recommendations</a:t>
             </a:r>
-            <a:endParaRPr/>
+            <a:endParaRPr dirty="0"/>
           </a:p>
           <a:p>
             <a:pPr marL="0" marR="0" lvl="0" indent="0" algn="ctr" rtl="0">
@@ -17056,7 +18430,7 @@
               </a:spcAft>
               <a:buNone/>
             </a:pPr>
-            <a:endParaRPr sz="4000">
+            <a:endParaRPr sz="4000" dirty="0">
               <a:solidFill>
                 <a:srgbClr val="FFFFFF"/>
               </a:solidFill>
@@ -17069,6 +18443,11 @@
         </p:txBody>
       </p:sp>
     </p:spTree>
+    <p:extLst>
+      <p:ext uri="{BB962C8B-B14F-4D97-AF65-F5344CB8AC3E}">
+        <p14:creationId xmlns:p14="http://schemas.microsoft.com/office/powerpoint/2010/main" val="753162414"/>
+      </p:ext>
+    </p:extLst>
   </p:cSld>
   <p:clrMapOvr>
     <a:masterClrMapping/>
@@ -17076,7 +18455,7 @@
 </p:sld>
 </file>
 
-<file path=ppt/slides/slide14.xml><?xml version="1.0" encoding="utf-8"?>
+<file path=ppt/slides/slide18.xml><?xml version="1.0" encoding="utf-8"?>
 <p:sld xmlns:a="http://schemas.openxmlformats.org/drawingml/2006/main" xmlns:r="http://schemas.openxmlformats.org/officeDocument/2006/relationships" xmlns:p="http://schemas.openxmlformats.org/presentationml/2006/main" showMasterSp="0">
   <p:cSld>
     <p:spTree>
@@ -20406,7 +21785,7 @@
           </a:bodyPr>
           <a:lstStyle/>
           <a:p>
-            <a:pPr marL="0" lvl="0" indent="0" algn="l" rtl="0">
+            <a:pPr lvl="0" indent="-457200" algn="l" rtl="0">
               <a:lnSpc>
                 <a:spcPct val="90000"/>
               </a:lnSpc>
@@ -20420,9 +21799,162 @@
                 <a:schemeClr val="lt1"/>
               </a:buClr>
               <a:buSzPts val="2800"/>
-              <a:buNone/>
+              <a:buFont typeface="Arial" panose="020B0604020202020204" pitchFamily="34" charset="0"/>
+              <a:buChar char="•"/>
             </a:pPr>
-            <a:endParaRPr dirty="0"/>
+            <a:r>
+              <a:rPr lang="en-US" sz="2800" dirty="0">
+                <a:effectLst/>
+                <a:latin typeface="Times New Roman" panose="02020603050405020304" pitchFamily="18" charset="0"/>
+                <a:ea typeface="Calibri" panose="020F0502020204030204" pitchFamily="34" charset="0"/>
+              </a:rPr>
+              <a:t>Removed Default column</a:t>
+            </a:r>
+          </a:p>
+          <a:p>
+            <a:pPr lvl="0" indent="-457200" algn="l" rtl="0">
+              <a:lnSpc>
+                <a:spcPct val="90000"/>
+              </a:lnSpc>
+              <a:spcBef>
+                <a:spcPts val="0"/>
+              </a:spcBef>
+              <a:spcAft>
+                <a:spcPts val="0"/>
+              </a:spcAft>
+              <a:buClr>
+                <a:schemeClr val="lt1"/>
+              </a:buClr>
+              <a:buSzPts val="2800"/>
+              <a:buFont typeface="Arial" panose="020B0604020202020204" pitchFamily="34" charset="0"/>
+              <a:buChar char="•"/>
+            </a:pPr>
+            <a:endParaRPr lang="en-US" dirty="0">
+              <a:latin typeface="Times New Roman" panose="02020603050405020304" pitchFamily="18" charset="0"/>
+              <a:ea typeface="Calibri" panose="020F0502020204030204" pitchFamily="34" charset="0"/>
+            </a:endParaRPr>
+          </a:p>
+          <a:p>
+            <a:pPr lvl="0" indent="-457200" algn="l" rtl="0">
+              <a:lnSpc>
+                <a:spcPct val="90000"/>
+              </a:lnSpc>
+              <a:spcBef>
+                <a:spcPts val="0"/>
+              </a:spcBef>
+              <a:spcAft>
+                <a:spcPts val="0"/>
+              </a:spcAft>
+              <a:buClr>
+                <a:schemeClr val="lt1"/>
+              </a:buClr>
+              <a:buSzPts val="2800"/>
+              <a:buFont typeface="Arial" panose="020B0604020202020204" pitchFamily="34" charset="0"/>
+              <a:buChar char="•"/>
+            </a:pPr>
+            <a:r>
+              <a:rPr lang="en-US" dirty="0">
+                <a:latin typeface="Times New Roman" panose="02020603050405020304" pitchFamily="18" charset="0"/>
+                <a:ea typeface="Calibri" panose="020F0502020204030204" pitchFamily="34" charset="0"/>
+              </a:rPr>
+              <a:t>Handle Outliers: box plot to detect outlier. </a:t>
+            </a:r>
+            <a:br>
+              <a:rPr lang="en-US" dirty="0">
+                <a:latin typeface="Times New Roman" panose="02020603050405020304" pitchFamily="18" charset="0"/>
+                <a:ea typeface="Calibri" panose="020F0502020204030204" pitchFamily="34" charset="0"/>
+              </a:rPr>
+            </a:br>
+            <a:endParaRPr lang="en-US" dirty="0">
+              <a:latin typeface="Times New Roman" panose="02020603050405020304" pitchFamily="18" charset="0"/>
+              <a:ea typeface="Calibri" panose="020F0502020204030204" pitchFamily="34" charset="0"/>
+            </a:endParaRPr>
+          </a:p>
+          <a:p>
+            <a:pPr lvl="0" indent="-457200" algn="l" rtl="0">
+              <a:lnSpc>
+                <a:spcPct val="90000"/>
+              </a:lnSpc>
+              <a:spcBef>
+                <a:spcPts val="0"/>
+              </a:spcBef>
+              <a:spcAft>
+                <a:spcPts val="0"/>
+              </a:spcAft>
+              <a:buClr>
+                <a:schemeClr val="lt1"/>
+              </a:buClr>
+              <a:buSzPts val="2800"/>
+              <a:buFont typeface="Arial" panose="020B0604020202020204" pitchFamily="34" charset="0"/>
+              <a:buChar char="•"/>
+            </a:pPr>
+            <a:r>
+              <a:rPr lang="en-US" sz="2800" dirty="0">
+                <a:effectLst/>
+                <a:latin typeface="Times New Roman" panose="02020603050405020304" pitchFamily="18" charset="0"/>
+                <a:ea typeface="Calibri" panose="020F0502020204030204" pitchFamily="34" charset="0"/>
+              </a:rPr>
+              <a:t>6 of the categorical variables have an "unknown" value.</a:t>
+            </a:r>
+            <a:endParaRPr lang="en-US" dirty="0">
+              <a:latin typeface="Times New Roman" panose="02020603050405020304" pitchFamily="18" charset="0"/>
+              <a:ea typeface="Calibri" panose="020F0502020204030204" pitchFamily="34" charset="0"/>
+            </a:endParaRPr>
+          </a:p>
+          <a:p>
+            <a:pPr lvl="0" indent="-457200" algn="l" rtl="0">
+              <a:lnSpc>
+                <a:spcPct val="90000"/>
+              </a:lnSpc>
+              <a:spcBef>
+                <a:spcPts val="0"/>
+              </a:spcBef>
+              <a:spcAft>
+                <a:spcPts val="0"/>
+              </a:spcAft>
+              <a:buClr>
+                <a:schemeClr val="lt1"/>
+              </a:buClr>
+              <a:buSzPts val="2800"/>
+              <a:buFont typeface="Arial" panose="020B0604020202020204" pitchFamily="34" charset="0"/>
+              <a:buChar char="•"/>
+            </a:pPr>
+            <a:endParaRPr lang="en-US" sz="2800" dirty="0">
+              <a:effectLst/>
+              <a:latin typeface="Times New Roman" panose="02020603050405020304" pitchFamily="18" charset="0"/>
+              <a:ea typeface="Calibri" panose="020F0502020204030204" pitchFamily="34" charset="0"/>
+            </a:endParaRPr>
+          </a:p>
+          <a:p>
+            <a:pPr lvl="0" indent="-457200" algn="l" rtl="0">
+              <a:lnSpc>
+                <a:spcPct val="90000"/>
+              </a:lnSpc>
+              <a:spcBef>
+                <a:spcPts val="0"/>
+              </a:spcBef>
+              <a:spcAft>
+                <a:spcPts val="0"/>
+              </a:spcAft>
+              <a:buClr>
+                <a:schemeClr val="lt1"/>
+              </a:buClr>
+              <a:buSzPts val="2800"/>
+              <a:buFont typeface="Arial" panose="020B0604020202020204" pitchFamily="34" charset="0"/>
+              <a:buChar char="•"/>
+            </a:pPr>
+            <a:r>
+              <a:rPr lang="en-US" dirty="0">
+                <a:latin typeface="Times New Roman" panose="02020603050405020304" pitchFamily="18" charset="0"/>
+                <a:ea typeface="Calibri" panose="020F0502020204030204" pitchFamily="34" charset="0"/>
+              </a:rPr>
+              <a:t>Replaced them with the most frequent category for the column </a:t>
+            </a:r>
+            <a:endParaRPr lang="en-US" sz="2800" dirty="0">
+              <a:effectLst/>
+              <a:latin typeface="Times New Roman" panose="02020603050405020304" pitchFamily="18" charset="0"/>
+              <a:ea typeface="Calibri" panose="020F0502020204030204" pitchFamily="34" charset="0"/>
+            </a:endParaRPr>
           </a:p>
         </p:txBody>
       </p:sp>
@@ -20512,7 +22044,7 @@
   <p:cSld>
     <p:spTree>
       <p:nvGrpSpPr>
-        <p:cNvPr id="1" name="Shape 196"/>
+        <p:cNvPr id="1" name="Shape 188"/>
         <p:cNvGrpSpPr/>
         <p:nvPr/>
       </p:nvGrpSpPr>
@@ -20526,18 +22058,18 @@
       </p:grpSpPr>
       <p:sp>
         <p:nvSpPr>
-          <p:cNvPr id="197" name="Google Shape;197;p9"/>
+          <p:cNvPr id="189" name="Google Shape;189;p8"/>
           <p:cNvSpPr txBox="1">
             <a:spLocks noGrp="1"/>
           </p:cNvSpPr>
           <p:nvPr>
-            <p:ph type="title"/>
+            <p:ph type="body" idx="1"/>
           </p:nvPr>
         </p:nvSpPr>
         <p:spPr>
           <a:xfrm>
-            <a:off x="286605" y="-88429"/>
-            <a:ext cx="11678688" cy="1359380"/>
+            <a:off x="5693658" y="1099536"/>
+            <a:ext cx="5526661" cy="5060374"/>
           </a:xfrm>
           <a:prstGeom prst="rect">
             <a:avLst/>
@@ -20548,76 +22080,251 @@
           </a:ln>
         </p:spPr>
         <p:txBody>
-          <a:bodyPr spcFirstLastPara="1" wrap="square" lIns="91425" tIns="45700" rIns="91425" bIns="45700" anchor="ctr" anchorCtr="0">
-            <a:normAutofit/>
+          <a:bodyPr spcFirstLastPara="1" wrap="square" lIns="91425" tIns="45700" rIns="91425" bIns="45700" anchor="t" anchorCtr="0">
+            <a:normAutofit fontScale="85000" lnSpcReduction="20000"/>
           </a:bodyPr>
           <a:lstStyle/>
           <a:p>
-            <a:pPr marL="0" lvl="0" indent="0" algn="l" rtl="0">
-              <a:lnSpc>
-                <a:spcPct val="90000"/>
-              </a:lnSpc>
-              <a:spcBef>
-                <a:spcPts val="0"/>
-              </a:spcBef>
-              <a:spcAft>
-                <a:spcPts val="0"/>
-              </a:spcAft>
-              <a:buClr>
-                <a:schemeClr val="lt1"/>
-              </a:buClr>
-              <a:buSzPts val="4400"/>
-              <a:buFont typeface="Calibri"/>
-              <a:buNone/>
+            <a:pPr marL="0" marR="0">
+              <a:lnSpc>
+                <a:spcPct val="115000"/>
+              </a:lnSpc>
+              <a:spcBef>
+                <a:spcPts val="0"/>
+              </a:spcBef>
+              <a:spcAft>
+                <a:spcPts val="0"/>
+              </a:spcAft>
             </a:pPr>
             <a:r>
-              <a:rPr lang="en-US" sz="4800" b="1" dirty="0"/>
-              <a:t>Target variable </a:t>
+              <a:rPr lang="en-US" sz="2800" dirty="0">
+                <a:effectLst/>
+                <a:latin typeface="Times New Roman" panose="02020603050405020304" pitchFamily="18" charset="0"/>
+                <a:ea typeface="Calibri" panose="020F0502020204030204" pitchFamily="34" charset="0"/>
+                <a:cs typeface="Times New Roman" panose="02020603050405020304" pitchFamily="18" charset="0"/>
+              </a:rPr>
+              <a:t>Logarithmic Transformation is applied to the "age" variable in order to get a more Gaussian-like distribution.</a:t>
             </a:r>
+          </a:p>
+          <a:p>
+            <a:pPr marL="0" marR="0">
+              <a:lnSpc>
+                <a:spcPct val="115000"/>
+              </a:lnSpc>
+              <a:spcBef>
+                <a:spcPts val="0"/>
+              </a:spcBef>
+              <a:spcAft>
+                <a:spcPts val="0"/>
+              </a:spcAft>
+            </a:pPr>
+            <a:endParaRPr lang="en-US" sz="2800" dirty="0">
+              <a:effectLst/>
+              <a:latin typeface="Times New Roman" panose="02020603050405020304" pitchFamily="18" charset="0"/>
+              <a:ea typeface="Calibri" panose="020F0502020204030204" pitchFamily="34" charset="0"/>
+              <a:cs typeface="Times New Roman" panose="02020603050405020304" pitchFamily="18" charset="0"/>
+            </a:endParaRPr>
+          </a:p>
+          <a:p>
+            <a:pPr marL="0" marR="0">
+              <a:lnSpc>
+                <a:spcPct val="115000"/>
+              </a:lnSpc>
+              <a:spcBef>
+                <a:spcPts val="0"/>
+              </a:spcBef>
+              <a:spcAft>
+                <a:spcPts val="0"/>
+              </a:spcAft>
+            </a:pPr>
             <a:r>
-              <a:rPr lang="en-US" sz="4000" b="1" dirty="0"/>
-              <a:t>Analysis</a:t>
+              <a:rPr lang="en-US" sz="2800" dirty="0">
+                <a:effectLst/>
+                <a:latin typeface="Times New Roman" panose="02020603050405020304" pitchFamily="18" charset="0"/>
+                <a:ea typeface="Calibri" panose="020F0502020204030204" pitchFamily="34" charset="0"/>
+                <a:cs typeface="Times New Roman" panose="02020603050405020304" pitchFamily="18" charset="0"/>
+              </a:rPr>
+              <a:t>Yeo-Johnson transformation is applied to duration variable to obtain gaussian like distribution.</a:t>
             </a:r>
-            <a:endParaRPr sz="4000" dirty="0"/>
+          </a:p>
+          <a:p>
+            <a:pPr marL="0" marR="0" indent="0">
+              <a:lnSpc>
+                <a:spcPct val="115000"/>
+              </a:lnSpc>
+              <a:spcBef>
+                <a:spcPts val="0"/>
+              </a:spcBef>
+              <a:spcAft>
+                <a:spcPts val="0"/>
+              </a:spcAft>
+              <a:buNone/>
+            </a:pPr>
+            <a:endParaRPr lang="en-US" sz="2800" dirty="0">
+              <a:effectLst/>
+              <a:latin typeface="Times New Roman" panose="02020603050405020304" pitchFamily="18" charset="0"/>
+              <a:ea typeface="Calibri" panose="020F0502020204030204" pitchFamily="34" charset="0"/>
+              <a:cs typeface="Times New Roman" panose="02020603050405020304" pitchFamily="18" charset="0"/>
+            </a:endParaRPr>
+          </a:p>
+          <a:p>
+            <a:pPr marL="0" marR="0">
+              <a:lnSpc>
+                <a:spcPct val="115000"/>
+              </a:lnSpc>
+              <a:spcBef>
+                <a:spcPts val="0"/>
+              </a:spcBef>
+              <a:spcAft>
+                <a:spcPts val="0"/>
+              </a:spcAft>
+            </a:pPr>
+            <a:r>
+              <a:rPr lang="en-US" sz="2800" dirty="0">
+                <a:effectLst/>
+                <a:latin typeface="Times New Roman" panose="02020603050405020304" pitchFamily="18" charset="0"/>
+                <a:ea typeface="Calibri" panose="020F0502020204030204" pitchFamily="34" charset="0"/>
+                <a:cs typeface="Times New Roman" panose="02020603050405020304" pitchFamily="18" charset="0"/>
+              </a:rPr>
+              <a:t>Binary features, house and loan, values of “yes” and “no” are replaced with “1” and “0”.</a:t>
+            </a:r>
+          </a:p>
+          <a:p>
+            <a:pPr marL="0" marR="0" indent="0">
+              <a:lnSpc>
+                <a:spcPct val="115000"/>
+              </a:lnSpc>
+              <a:spcBef>
+                <a:spcPts val="0"/>
+              </a:spcBef>
+              <a:spcAft>
+                <a:spcPts val="0"/>
+              </a:spcAft>
+              <a:buNone/>
+            </a:pPr>
+            <a:endParaRPr lang="en-US" sz="2800" dirty="0">
+              <a:effectLst/>
+              <a:latin typeface="Times New Roman" panose="02020603050405020304" pitchFamily="18" charset="0"/>
+              <a:ea typeface="Calibri" panose="020F0502020204030204" pitchFamily="34" charset="0"/>
+              <a:cs typeface="Times New Roman" panose="02020603050405020304" pitchFamily="18" charset="0"/>
+            </a:endParaRPr>
+          </a:p>
+          <a:p>
+            <a:pPr marL="0" marR="0">
+              <a:lnSpc>
+                <a:spcPct val="115000"/>
+              </a:lnSpc>
+              <a:spcBef>
+                <a:spcPts val="0"/>
+              </a:spcBef>
+              <a:spcAft>
+                <a:spcPts val="0"/>
+              </a:spcAft>
+            </a:pPr>
+            <a:r>
+              <a:rPr lang="en-US" sz="2800" dirty="0">
+                <a:effectLst/>
+                <a:latin typeface="Times New Roman" panose="02020603050405020304" pitchFamily="18" charset="0"/>
+                <a:ea typeface="Calibri" panose="020F0502020204030204" pitchFamily="34" charset="0"/>
+                <a:cs typeface="Times New Roman" panose="02020603050405020304" pitchFamily="18" charset="0"/>
+              </a:rPr>
+              <a:t>Ordinal Encoding is done for education column </a:t>
+            </a:r>
+          </a:p>
+          <a:p>
+            <a:pPr marL="0" marR="0">
+              <a:lnSpc>
+                <a:spcPct val="115000"/>
+              </a:lnSpc>
+              <a:spcBef>
+                <a:spcPts val="0"/>
+              </a:spcBef>
+              <a:spcAft>
+                <a:spcPts val="0"/>
+              </a:spcAft>
+            </a:pPr>
+            <a:endParaRPr lang="en-US" sz="2800" dirty="0">
+              <a:effectLst/>
+              <a:latin typeface="Times New Roman" panose="02020603050405020304" pitchFamily="18" charset="0"/>
+              <a:ea typeface="Calibri" panose="020F0502020204030204" pitchFamily="34" charset="0"/>
+              <a:cs typeface="Times New Roman" panose="02020603050405020304" pitchFamily="18" charset="0"/>
+            </a:endParaRPr>
+          </a:p>
+          <a:p>
+            <a:pPr marL="0" marR="0">
+              <a:lnSpc>
+                <a:spcPct val="115000"/>
+              </a:lnSpc>
+              <a:spcBef>
+                <a:spcPts val="0"/>
+              </a:spcBef>
+              <a:spcAft>
+                <a:spcPts val="0"/>
+              </a:spcAft>
+            </a:pPr>
+            <a:endParaRPr lang="en-US" dirty="0">
+              <a:latin typeface="Times New Roman" panose="02020603050405020304" pitchFamily="18" charset="0"/>
+              <a:ea typeface="Times New Roman" panose="02020603050405020304" pitchFamily="18" charset="0"/>
+              <a:cs typeface="Times New Roman" panose="02020603050405020304" pitchFamily="18" charset="0"/>
+            </a:endParaRPr>
+          </a:p>
+          <a:p>
+            <a:pPr marL="0" marR="0">
+              <a:lnSpc>
+                <a:spcPct val="115000"/>
+              </a:lnSpc>
+              <a:spcBef>
+                <a:spcPts val="0"/>
+              </a:spcBef>
+              <a:spcAft>
+                <a:spcPts val="0"/>
+              </a:spcAft>
+            </a:pPr>
+            <a:endParaRPr lang="en-US" sz="2800" dirty="0">
+              <a:effectLst/>
+              <a:latin typeface="Times New Roman" panose="02020603050405020304" pitchFamily="18" charset="0"/>
+              <a:ea typeface="Times New Roman" panose="02020603050405020304" pitchFamily="18" charset="0"/>
+            </a:endParaRPr>
           </a:p>
         </p:txBody>
       </p:sp>
       <p:pic>
         <p:nvPicPr>
-          <p:cNvPr id="2" name="Picture 1"/>
-          <p:cNvPicPr>
-            <a:picLocks noChangeAspect="1"/>
-          </p:cNvPicPr>
+          <p:cNvPr id="190" name="Google Shape;190;p8"/>
+          <p:cNvPicPr preferRelativeResize="0"/>
           <p:nvPr/>
         </p:nvPicPr>
-        <p:blipFill>
-          <a:blip r:embed="rId3"/>
-          <a:stretch>
-            <a:fillRect/>
-          </a:stretch>
+        <p:blipFill rotWithShape="1">
+          <a:blip r:embed="rId3">
+            <a:alphaModFix/>
+          </a:blip>
+          <a:srcRect b="320"/>
+          <a:stretch/>
         </p:blipFill>
         <p:spPr>
-          <a:xfrm>
-            <a:off x="461322" y="1565725"/>
-            <a:ext cx="6351843" cy="4725893"/>
+          <a:xfrm rot="10799999">
+            <a:off x="711040" y="1575974"/>
+            <a:ext cx="4105765" cy="4114519"/>
           </a:xfrm>
           <a:prstGeom prst="rect">
             <a:avLst/>
           </a:prstGeom>
+          <a:noFill/>
+          <a:ln>
+            <a:noFill/>
+          </a:ln>
         </p:spPr>
       </p:pic>
       <p:sp>
         <p:nvSpPr>
-          <p:cNvPr id="9" name="Google Shape;197;p9"/>
-          <p:cNvSpPr txBox="1">
-            <a:spLocks/>
-          </p:cNvSpPr>
+          <p:cNvPr id="191" name="Google Shape;191;p8"/>
+          <p:cNvSpPr txBox="1"/>
           <p:nvPr/>
         </p:nvSpPr>
         <p:spPr>
           <a:xfrm>
-            <a:off x="7137779" y="1442394"/>
-            <a:ext cx="4636879" cy="4849223"/>
+            <a:off x="1104642" y="2832450"/>
+            <a:ext cx="3402347" cy="1477328"/>
           </a:xfrm>
           <a:prstGeom prst="rect">
             <a:avLst/>
@@ -20628,281 +22335,38 @@
           </a:ln>
         </p:spPr>
         <p:txBody>
-          <a:bodyPr spcFirstLastPara="1" wrap="square" lIns="91425" tIns="45700" rIns="91425" bIns="45700" anchor="ctr" anchorCtr="0">
-            <a:normAutofit/>
+          <a:bodyPr spcFirstLastPara="1" wrap="square" lIns="0" tIns="0" rIns="0" bIns="0" anchor="t" anchorCtr="0">
+            <a:spAutoFit/>
           </a:bodyPr>
-          <a:lstStyle>
-            <a:defPPr marR="0" lvl="0" algn="l" rtl="0">
-              <a:lnSpc>
-                <a:spcPct val="100000"/>
-              </a:lnSpc>
-              <a:spcBef>
-                <a:spcPts val="0"/>
-              </a:spcBef>
-              <a:spcAft>
-                <a:spcPts val="0"/>
-              </a:spcAft>
-            </a:defPPr>
-            <a:lvl1pPr marR="0" lvl="0" algn="l" rtl="0">
-              <a:lnSpc>
-                <a:spcPct val="90000"/>
-              </a:lnSpc>
-              <a:spcBef>
-                <a:spcPts val="0"/>
-              </a:spcBef>
-              <a:spcAft>
-                <a:spcPts val="0"/>
-              </a:spcAft>
-              <a:buClr>
-                <a:schemeClr val="lt1"/>
-              </a:buClr>
-              <a:buSzPts val="1800"/>
-              <a:buFont typeface="Calibri"/>
-              <a:buNone/>
-              <a:defRPr sz="4400" b="0" i="0" u="none" strike="noStrike" cap="none">
-                <a:solidFill>
-                  <a:schemeClr val="lt1"/>
-                </a:solidFill>
-                <a:latin typeface="Calibri"/>
-                <a:ea typeface="Calibri"/>
-                <a:cs typeface="Calibri"/>
-                <a:sym typeface="Calibri"/>
-              </a:defRPr>
-            </a:lvl1pPr>
-            <a:lvl2pPr marR="0" lvl="1" algn="l" rtl="0">
-              <a:lnSpc>
-                <a:spcPct val="100000"/>
-              </a:lnSpc>
-              <a:spcBef>
-                <a:spcPts val="0"/>
-              </a:spcBef>
-              <a:spcAft>
-                <a:spcPts val="0"/>
-              </a:spcAft>
-              <a:buClr>
-                <a:srgbClr val="000000"/>
-              </a:buClr>
-              <a:buSzPts val="1400"/>
-              <a:buFont typeface="Arial"/>
-              <a:buNone/>
-              <a:defRPr sz="1800" b="0" i="0" u="none" strike="noStrike" cap="none">
-                <a:solidFill>
-                  <a:srgbClr val="000000"/>
-                </a:solidFill>
-                <a:latin typeface="Arial"/>
-                <a:ea typeface="Arial"/>
-                <a:cs typeface="Arial"/>
-                <a:sym typeface="Arial"/>
-              </a:defRPr>
-            </a:lvl2pPr>
-            <a:lvl3pPr marR="0" lvl="2" algn="l" rtl="0">
-              <a:lnSpc>
-                <a:spcPct val="100000"/>
-              </a:lnSpc>
-              <a:spcBef>
-                <a:spcPts val="0"/>
-              </a:spcBef>
-              <a:spcAft>
-                <a:spcPts val="0"/>
-              </a:spcAft>
-              <a:buClr>
-                <a:srgbClr val="000000"/>
-              </a:buClr>
-              <a:buSzPts val="1400"/>
-              <a:buFont typeface="Arial"/>
-              <a:buNone/>
-              <a:defRPr sz="1800" b="0" i="0" u="none" strike="noStrike" cap="none">
-                <a:solidFill>
-                  <a:srgbClr val="000000"/>
-                </a:solidFill>
-                <a:latin typeface="Arial"/>
-                <a:ea typeface="Arial"/>
-                <a:cs typeface="Arial"/>
-                <a:sym typeface="Arial"/>
-              </a:defRPr>
-            </a:lvl3pPr>
-            <a:lvl4pPr marR="0" lvl="3" algn="l" rtl="0">
-              <a:lnSpc>
-                <a:spcPct val="100000"/>
-              </a:lnSpc>
-              <a:spcBef>
-                <a:spcPts val="0"/>
-              </a:spcBef>
-              <a:spcAft>
-                <a:spcPts val="0"/>
-              </a:spcAft>
-              <a:buClr>
-                <a:srgbClr val="000000"/>
-              </a:buClr>
-              <a:buSzPts val="1400"/>
-              <a:buFont typeface="Arial"/>
-              <a:buNone/>
-              <a:defRPr sz="1800" b="0" i="0" u="none" strike="noStrike" cap="none">
-                <a:solidFill>
-                  <a:srgbClr val="000000"/>
-                </a:solidFill>
-                <a:latin typeface="Arial"/>
-                <a:ea typeface="Arial"/>
-                <a:cs typeface="Arial"/>
-                <a:sym typeface="Arial"/>
-              </a:defRPr>
-            </a:lvl4pPr>
-            <a:lvl5pPr marR="0" lvl="4" algn="l" rtl="0">
-              <a:lnSpc>
-                <a:spcPct val="100000"/>
-              </a:lnSpc>
-              <a:spcBef>
-                <a:spcPts val="0"/>
-              </a:spcBef>
-              <a:spcAft>
-                <a:spcPts val="0"/>
-              </a:spcAft>
-              <a:buClr>
-                <a:srgbClr val="000000"/>
-              </a:buClr>
-              <a:buSzPts val="1400"/>
-              <a:buFont typeface="Arial"/>
-              <a:buNone/>
-              <a:defRPr sz="1800" b="0" i="0" u="none" strike="noStrike" cap="none">
-                <a:solidFill>
-                  <a:srgbClr val="000000"/>
-                </a:solidFill>
-                <a:latin typeface="Arial"/>
-                <a:ea typeface="Arial"/>
-                <a:cs typeface="Arial"/>
-                <a:sym typeface="Arial"/>
-              </a:defRPr>
-            </a:lvl5pPr>
-            <a:lvl6pPr marR="0" lvl="5" algn="l" rtl="0">
-              <a:lnSpc>
-                <a:spcPct val="100000"/>
-              </a:lnSpc>
-              <a:spcBef>
-                <a:spcPts val="0"/>
-              </a:spcBef>
-              <a:spcAft>
-                <a:spcPts val="0"/>
-              </a:spcAft>
-              <a:buClr>
-                <a:srgbClr val="000000"/>
-              </a:buClr>
-              <a:buSzPts val="1400"/>
-              <a:buFont typeface="Arial"/>
-              <a:buNone/>
-              <a:defRPr sz="1800" b="0" i="0" u="none" strike="noStrike" cap="none">
-                <a:solidFill>
-                  <a:srgbClr val="000000"/>
-                </a:solidFill>
-                <a:latin typeface="Arial"/>
-                <a:ea typeface="Arial"/>
-                <a:cs typeface="Arial"/>
-                <a:sym typeface="Arial"/>
-              </a:defRPr>
-            </a:lvl6pPr>
-            <a:lvl7pPr marR="0" lvl="6" algn="l" rtl="0">
-              <a:lnSpc>
-                <a:spcPct val="100000"/>
-              </a:lnSpc>
-              <a:spcBef>
-                <a:spcPts val="0"/>
-              </a:spcBef>
-              <a:spcAft>
-                <a:spcPts val="0"/>
-              </a:spcAft>
-              <a:buClr>
-                <a:srgbClr val="000000"/>
-              </a:buClr>
-              <a:buSzPts val="1400"/>
-              <a:buFont typeface="Arial"/>
-              <a:buNone/>
-              <a:defRPr sz="1800" b="0" i="0" u="none" strike="noStrike" cap="none">
-                <a:solidFill>
-                  <a:srgbClr val="000000"/>
-                </a:solidFill>
-                <a:latin typeface="Arial"/>
-                <a:ea typeface="Arial"/>
-                <a:cs typeface="Arial"/>
-                <a:sym typeface="Arial"/>
-              </a:defRPr>
-            </a:lvl7pPr>
-            <a:lvl8pPr marR="0" lvl="7" algn="l" rtl="0">
-              <a:lnSpc>
-                <a:spcPct val="100000"/>
-              </a:lnSpc>
-              <a:spcBef>
-                <a:spcPts val="0"/>
-              </a:spcBef>
-              <a:spcAft>
-                <a:spcPts val="0"/>
-              </a:spcAft>
-              <a:buClr>
-                <a:srgbClr val="000000"/>
-              </a:buClr>
-              <a:buSzPts val="1400"/>
-              <a:buFont typeface="Arial"/>
-              <a:buNone/>
-              <a:defRPr sz="1800" b="0" i="0" u="none" strike="noStrike" cap="none">
-                <a:solidFill>
-                  <a:srgbClr val="000000"/>
-                </a:solidFill>
-                <a:latin typeface="Arial"/>
-                <a:ea typeface="Arial"/>
-                <a:cs typeface="Arial"/>
-                <a:sym typeface="Arial"/>
-              </a:defRPr>
-            </a:lvl8pPr>
-            <a:lvl9pPr marR="0" lvl="8" algn="l" rtl="0">
-              <a:lnSpc>
-                <a:spcPct val="100000"/>
-              </a:lnSpc>
-              <a:spcBef>
-                <a:spcPts val="0"/>
-              </a:spcBef>
-              <a:spcAft>
-                <a:spcPts val="0"/>
-              </a:spcAft>
-              <a:buClr>
-                <a:srgbClr val="000000"/>
-              </a:buClr>
-              <a:buSzPts val="1400"/>
-              <a:buFont typeface="Arial"/>
-              <a:buNone/>
-              <a:defRPr sz="1800" b="0" i="0" u="none" strike="noStrike" cap="none">
-                <a:solidFill>
-                  <a:srgbClr val="000000"/>
-                </a:solidFill>
-                <a:latin typeface="Arial"/>
-                <a:ea typeface="Arial"/>
-                <a:cs typeface="Arial"/>
-                <a:sym typeface="Arial"/>
-              </a:defRPr>
-            </a:lvl9pPr>
-          </a:lstStyle>
-          <a:p>
-            <a:pPr marL="571500" indent="-571500">
-              <a:buSzPts val="4400"/>
-              <a:buFont typeface="Arial" panose="020B0604020202020204" pitchFamily="34" charset="0"/>
-              <a:buChar char="•"/>
+          <a:lstStyle/>
+          <a:p>
+            <a:pPr marL="0" marR="0" lvl="0" indent="0" algn="ctr" rtl="0">
+              <a:spcBef>
+                <a:spcPts val="0"/>
+              </a:spcBef>
+              <a:spcAft>
+                <a:spcPts val="0"/>
+              </a:spcAft>
+              <a:buNone/>
             </a:pPr>
             <a:r>
-              <a:rPr lang="en-US" sz="4000" dirty="0"/>
-              <a:t>An imbalance in the target variable. </a:t>
+              <a:rPr lang="en-US" sz="4800" b="1" dirty="0">
+                <a:solidFill>
+                  <a:srgbClr val="FFC000"/>
+                </a:solidFill>
+              </a:rPr>
+              <a:t>Model Preparation</a:t>
             </a:r>
-          </a:p>
-          <a:p>
-            <a:pPr marL="571500" indent="-571500">
-              <a:buSzPts val="4400"/>
-              <a:buFont typeface="Arial" panose="020B0604020202020204" pitchFamily="34" charset="0"/>
-              <a:buChar char="•"/>
-            </a:pPr>
-            <a:r>
-              <a:rPr lang="en-US" sz="4000" dirty="0"/>
-              <a:t>An oversampling technique must be applied before model building</a:t>
-            </a:r>
+            <a:endParaRPr dirty="0"/>
           </a:p>
         </p:txBody>
       </p:sp>
     </p:spTree>
+    <p:extLst>
+      <p:ext uri="{BB962C8B-B14F-4D97-AF65-F5344CB8AC3E}">
+        <p14:creationId xmlns:p14="http://schemas.microsoft.com/office/powerpoint/2010/main" val="509725929"/>
+      </p:ext>
+    </p:extLst>
   </p:cSld>
   <p:clrMapOvr>
     <a:masterClrMapping/>

</xml_diff>